<commit_message>
logo IC nella presentazione
</commit_message>
<xml_diff>
--- a/src/docs/presentations/21maggio.pptx
+++ b/src/docs/presentations/21maggio.pptx
@@ -69,7 +69,7 @@
         <p:txBody>
           <a:bodyPr/>
           <a:p>
-            <a:fld id="{213E653F-020F-4F83-8C87-3714D54741DE}" type="slidenum">
+            <a:fld id="{8EEB8668-16C9-4082-9937-86B4B4BDAE56}" type="slidenum">
               <a:t>&lt;#&gt;</a:t>
             </a:fld>
           </a:p>
@@ -257,7 +257,7 @@
         <p:txBody>
           <a:bodyPr/>
           <a:p>
-            <a:fld id="{B1AF9F48-E029-45C5-AC3F-2135BED2829E}" type="slidenum">
+            <a:fld id="{4BE7F892-1838-4C73-81E9-6EF70F73E2C8}" type="slidenum">
               <a:t>&lt;#&gt;</a:t>
             </a:fld>
           </a:p>
@@ -513,7 +513,7 @@
         <p:txBody>
           <a:bodyPr/>
           <a:p>
-            <a:fld id="{32CF131A-2E0D-4596-9CB6-EA586B735040}" type="slidenum">
+            <a:fld id="{DC7407A8-6F5B-45AE-8872-765FF74E752D}" type="slidenum">
               <a:t>&lt;#&gt;</a:t>
             </a:fld>
           </a:p>
@@ -837,7 +837,7 @@
         <p:txBody>
           <a:bodyPr/>
           <a:p>
-            <a:fld id="{8EDAF94C-E4BB-4115-B44D-49BE0E33B562}" type="slidenum">
+            <a:fld id="{A31300BC-D91D-48D3-8843-15F4B53CCD00}" type="slidenum">
               <a:t>&lt;#&gt;</a:t>
             </a:fld>
           </a:p>
@@ -920,7 +920,7 @@
         <p:txBody>
           <a:bodyPr/>
           <a:p>
-            <a:fld id="{28220CBA-C854-42A6-BF12-6061A1811518}" type="slidenum">
+            <a:fld id="{890014B5-F78D-425B-B025-C371F7B81AE6}" type="slidenum">
               <a:t>&lt;#&gt;</a:t>
             </a:fld>
           </a:p>
@@ -1077,7 +1077,7 @@
         <p:txBody>
           <a:bodyPr/>
           <a:p>
-            <a:fld id="{4632ED60-13EA-4871-AC13-E9241160FA5A}" type="slidenum">
+            <a:fld id="{5FB54A25-3AE7-4DA1-93F4-BB854E51C43B}" type="slidenum">
               <a:t>&lt;#&gt;</a:t>
             </a:fld>
           </a:p>
@@ -1231,7 +1231,7 @@
         <p:txBody>
           <a:bodyPr/>
           <a:p>
-            <a:fld id="{4C137BAF-43A0-4823-BF6B-2184D69C56DF}" type="slidenum">
+            <a:fld id="{044EE76E-C4F8-4233-BA4F-EE7FAD58E70B}" type="slidenum">
               <a:t>&lt;#&gt;</a:t>
             </a:fld>
           </a:p>
@@ -1419,7 +1419,7 @@
         <p:txBody>
           <a:bodyPr/>
           <a:p>
-            <a:fld id="{CDD530EF-0542-4934-A5F7-26D087130BC9}" type="slidenum">
+            <a:fld id="{9B9776FF-B0CF-4EBC-9740-53758D62EF43}" type="slidenum">
               <a:t>&lt;#&gt;</a:t>
             </a:fld>
           </a:p>
@@ -1539,7 +1539,7 @@
         <p:txBody>
           <a:bodyPr/>
           <a:p>
-            <a:fld id="{074525DB-E80D-4224-9157-0A6D8DA77864}" type="slidenum">
+            <a:fld id="{BF28877A-C4B8-4C58-A777-BBC095501AE9}" type="slidenum">
               <a:t>&lt;#&gt;</a:t>
             </a:fld>
           </a:p>
@@ -1659,7 +1659,7 @@
         <p:txBody>
           <a:bodyPr/>
           <a:p>
-            <a:fld id="{FB76AD69-4430-4A26-9DEC-BEA43CF4FE01}" type="slidenum">
+            <a:fld id="{6D537161-0517-45E8-ADAE-811B70E19E53}" type="slidenum">
               <a:t>&lt;#&gt;</a:t>
             </a:fld>
           </a:p>
@@ -1881,7 +1881,7 @@
         <p:txBody>
           <a:bodyPr/>
           <a:p>
-            <a:fld id="{8D3DF665-66E6-4830-926E-9FC2414C972A}" type="slidenum">
+            <a:fld id="{7F6513D2-45B1-4F3B-922B-42322FDFE1F8}" type="slidenum">
               <a:t>&lt;#&gt;</a:t>
             </a:fld>
           </a:p>
@@ -2038,7 +2038,7 @@
         <p:txBody>
           <a:bodyPr/>
           <a:p>
-            <a:fld id="{0DC3C18F-64F3-40EA-98E5-4F4173235B47}" type="slidenum">
+            <a:fld id="{0BD299E0-47DE-4706-8D98-2873784659D0}" type="slidenum">
               <a:t>&lt;#&gt;</a:t>
             </a:fld>
           </a:p>
@@ -2260,7 +2260,7 @@
         <p:txBody>
           <a:bodyPr/>
           <a:p>
-            <a:fld id="{E6886626-AB71-47AF-B619-E6F59335DC5A}" type="slidenum">
+            <a:fld id="{64BBC044-A866-4490-842E-3BF2FCBE0442}" type="slidenum">
               <a:t>&lt;#&gt;</a:t>
             </a:fld>
           </a:p>
@@ -2482,7 +2482,7 @@
         <p:txBody>
           <a:bodyPr/>
           <a:p>
-            <a:fld id="{9D2A3DE1-5CF1-4663-BF8A-84E473E8940E}" type="slidenum">
+            <a:fld id="{4A17AA8F-42B0-41DE-A02C-6357B13280D6}" type="slidenum">
               <a:t>&lt;#&gt;</a:t>
             </a:fld>
           </a:p>
@@ -2670,7 +2670,7 @@
         <p:txBody>
           <a:bodyPr/>
           <a:p>
-            <a:fld id="{5AF8A2E5-D789-4E8B-9D73-C83C97670955}" type="slidenum">
+            <a:fld id="{FCBBA52D-8830-4B07-87C8-FD9569588F82}" type="slidenum">
               <a:t>&lt;#&gt;</a:t>
             </a:fld>
           </a:p>
@@ -2926,7 +2926,7 @@
         <p:txBody>
           <a:bodyPr/>
           <a:p>
-            <a:fld id="{2C718EDB-79D3-4021-97BD-A313F7511B6F}" type="slidenum">
+            <a:fld id="{2FC48882-E278-4137-B527-6DB4F79D6E81}" type="slidenum">
               <a:t>&lt;#&gt;</a:t>
             </a:fld>
           </a:p>
@@ -3250,7 +3250,7 @@
         <p:txBody>
           <a:bodyPr/>
           <a:p>
-            <a:fld id="{76CCE4A2-8E42-4A3F-A0B7-62A339C472DD}" type="slidenum">
+            <a:fld id="{C8EC868C-FD9C-4038-ACFE-BD2619A1179E}" type="slidenum">
               <a:t>&lt;#&gt;</a:t>
             </a:fld>
           </a:p>
@@ -3404,7 +3404,7 @@
         <p:txBody>
           <a:bodyPr/>
           <a:p>
-            <a:fld id="{B937FC7D-7E3E-4AB0-AB57-BF83016086FE}" type="slidenum">
+            <a:fld id="{6346C029-AB1E-40E7-AB43-FDDB8E2A7EDA}" type="slidenum">
               <a:t>&lt;#&gt;</a:t>
             </a:fld>
           </a:p>
@@ -3592,7 +3592,7 @@
         <p:txBody>
           <a:bodyPr/>
           <a:p>
-            <a:fld id="{BC926940-2841-4D28-BC0E-763C8B1DD585}" type="slidenum">
+            <a:fld id="{466E48A1-A93F-4DC9-A608-F54C400DCF8C}" type="slidenum">
               <a:t>&lt;#&gt;</a:t>
             </a:fld>
           </a:p>
@@ -3712,7 +3712,7 @@
         <p:txBody>
           <a:bodyPr/>
           <a:p>
-            <a:fld id="{2AAF488B-5212-4A98-BBC3-0896CC5880AF}" type="slidenum">
+            <a:fld id="{80C43043-B775-49B5-9D33-453022ADA598}" type="slidenum">
               <a:t>&lt;#&gt;</a:t>
             </a:fld>
           </a:p>
@@ -3832,7 +3832,7 @@
         <p:txBody>
           <a:bodyPr/>
           <a:p>
-            <a:fld id="{AF74DF92-851A-4EAD-A157-1D6C9A64007A}" type="slidenum">
+            <a:fld id="{83374148-A62F-45B7-A5A1-673773CCE02A}" type="slidenum">
               <a:t>&lt;#&gt;</a:t>
             </a:fld>
           </a:p>
@@ -4054,7 +4054,7 @@
         <p:txBody>
           <a:bodyPr/>
           <a:p>
-            <a:fld id="{B40CA6F5-3933-493B-AA56-E01797F16B28}" type="slidenum">
+            <a:fld id="{19574019-3138-49C0-A599-7D26826C6055}" type="slidenum">
               <a:t>&lt;#&gt;</a:t>
             </a:fld>
           </a:p>
@@ -4276,7 +4276,7 @@
         <p:txBody>
           <a:bodyPr/>
           <a:p>
-            <a:fld id="{305229B2-B0BF-46EF-A625-C6BA045EBAF9}" type="slidenum">
+            <a:fld id="{4456662C-2770-4CAD-9530-2D8A104DF71B}" type="slidenum">
               <a:t>&lt;#&gt;</a:t>
             </a:fld>
           </a:p>
@@ -4498,7 +4498,7 @@
         <p:txBody>
           <a:bodyPr/>
           <a:p>
-            <a:fld id="{7EB875FA-34C4-4279-A889-87ECC9AA2F5E}" type="slidenum">
+            <a:fld id="{A11ABC20-6C91-413F-84B8-2AE3BB42EB06}" type="slidenum">
               <a:t>&lt;#&gt;</a:t>
             </a:fld>
           </a:p>
@@ -4563,7 +4563,7 @@
         <p:spPr>
           <a:xfrm>
             <a:off x="4718160" y="0"/>
-            <a:ext cx="7470360" cy="6854760"/>
+            <a:ext cx="7469640" cy="6854040"/>
           </a:xfrm>
           <a:prstGeom prst="rect">
             <a:avLst/>
@@ -4601,7 +4601,7 @@
         <p:spPr>
           <a:xfrm rot="5400000">
             <a:off x="1257120" y="3396960"/>
-            <a:ext cx="6854760" cy="60840"/>
+            <a:ext cx="6854040" cy="60120"/>
           </a:xfrm>
           <a:prstGeom prst="rect">
             <a:avLst/>
@@ -4636,8 +4636,8 @@
         </p:nvSpPr>
         <p:spPr>
           <a:xfrm flipH="1">
-            <a:off x="-2880" y="0"/>
-            <a:ext cx="12188880" cy="6854760"/>
+            <a:off x="-3600" y="0"/>
+            <a:ext cx="12188160" cy="6854040"/>
           </a:xfrm>
           <a:prstGeom prst="rect">
             <a:avLst/>
@@ -4673,7 +4673,7 @@
         <p:spPr>
           <a:xfrm>
             <a:off x="0" y="825840"/>
-            <a:ext cx="6792840" cy="2590920"/>
+            <a:ext cx="6792120" cy="2590200"/>
           </a:xfrm>
           <a:prstGeom prst="rect">
             <a:avLst/>
@@ -4709,7 +4709,7 @@
         <p:spPr>
           <a:xfrm>
             <a:off x="0" y="889560"/>
-            <a:ext cx="1067400" cy="2463120"/>
+            <a:ext cx="1066680" cy="2462400"/>
           </a:xfrm>
           <a:prstGeom prst="rect">
             <a:avLst/>
@@ -4744,8 +4744,8 @@
         </p:nvSpPr>
         <p:spPr>
           <a:xfrm rot="5400000">
-            <a:off x="-2361960" y="3396960"/>
-            <a:ext cx="6854760" cy="60840"/>
+            <a:off x="-2361240" y="3396960"/>
+            <a:ext cx="6854040" cy="60120"/>
           </a:xfrm>
           <a:prstGeom prst="rect">
             <a:avLst/>
@@ -4781,7 +4781,7 @@
         <p:spPr>
           <a:xfrm rot="5400000">
             <a:off x="3398760" y="3396960"/>
-            <a:ext cx="6854760" cy="60840"/>
+            <a:ext cx="6854040" cy="60120"/>
           </a:xfrm>
           <a:prstGeom prst="rect">
             <a:avLst/>
@@ -4821,7 +4821,7 @@
         <p:spPr>
           <a:xfrm>
             <a:off x="1635120" y="6309360"/>
-            <a:ext cx="4794120" cy="453960"/>
+            <a:ext cx="4793400" cy="453240"/>
           </a:xfrm>
           <a:prstGeom prst="rect">
             <a:avLst/>
@@ -4841,7 +4841,7 @@
                 <a:spcPct val="100000"/>
               </a:lnSpc>
               <a:buNone/>
-              <a:defRPr b="0" lang="en-GB" sz="1200" spc="126" strike="noStrike">
+              <a:defRPr b="0" lang="en-GB" sz="1200" spc="120" strike="noStrike">
                 <a:solidFill>
                   <a:srgbClr val="404040"/>
                 </a:solidFill>
@@ -4857,13 +4857,13 @@
               <a:buNone/>
             </a:pPr>
             <a:r>
-              <a:rPr b="0" lang="en-GB" sz="1200" spc="126" strike="noStrike">
+              <a:rPr b="0" lang="en-GB" sz="1200" spc="120" strike="noStrike">
                 <a:solidFill>
                   <a:srgbClr val="404040"/>
                 </a:solidFill>
                 <a:latin typeface="Meiryo"/>
               </a:rPr>
-              <a:t> </a:t>
+              <a:t>&lt;footer&gt;</a:t>
             </a:r>
             <a:endParaRPr b="0" lang="it-IT" sz="1200" spc="-1" strike="noStrike">
               <a:latin typeface="Times New Roman"/>
@@ -4884,7 +4884,7 @@
         <p:spPr>
           <a:xfrm>
             <a:off x="10569240" y="6309360"/>
-            <a:ext cx="976680" cy="453960"/>
+            <a:ext cx="975960" cy="453240"/>
           </a:xfrm>
           <a:prstGeom prst="rect">
             <a:avLst/>
@@ -4904,7 +4904,7 @@
                 <a:spcPct val="100000"/>
               </a:lnSpc>
               <a:buNone/>
-              <a:defRPr b="1" lang="en-US" sz="1600" spc="126" strike="noStrike">
+              <a:defRPr b="1" lang="en-US" sz="1600" spc="120" strike="noStrike">
                 <a:solidFill>
                   <a:srgbClr val="ffffff"/>
                 </a:solidFill>
@@ -4919,14 +4919,14 @@
               </a:lnSpc>
               <a:buNone/>
             </a:pPr>
-            <a:fld id="{6B5672DB-C00D-48EF-9C01-8D0EC42E2A67}" type="slidenum">
-              <a:rPr b="1" lang="en-US" sz="1600" spc="126" strike="noStrike">
+            <a:fld id="{22B5B8A3-50E6-421E-B0E5-1D45B3D49FE6}" type="slidenum">
+              <a:rPr b="1" lang="en-US" sz="1600" spc="120" strike="noStrike">
                 <a:solidFill>
                   <a:srgbClr val="ffffff"/>
                 </a:solidFill>
                 <a:latin typeface="Meiryo"/>
               </a:rPr>
-              <a:t>6</a:t>
+              <a:t>&lt;number&gt;</a:t>
             </a:fld>
             <a:endParaRPr b="0" lang="it-IT" sz="1600" spc="-1" strike="noStrike">
               <a:latin typeface="Times New Roman"/>
@@ -4947,7 +4947,7 @@
         <p:spPr>
           <a:xfrm>
             <a:off x="8197200" y="6309360"/>
-            <a:ext cx="2147760" cy="453960"/>
+            <a:ext cx="2147040" cy="453240"/>
           </a:xfrm>
           <a:prstGeom prst="rect">
             <a:avLst/>
@@ -4973,7 +4973,7 @@
               <a:rPr b="0" lang="it-IT" sz="1400" spc="-1" strike="noStrike">
                 <a:latin typeface="Times New Roman"/>
               </a:rPr>
-              <a:t> </a:t>
+              <a:t>&lt;date/time&gt;</a:t>
             </a:r>
             <a:endParaRPr b="0" lang="it-IT" sz="1400" spc="-1" strike="noStrike">
               <a:latin typeface="Times New Roman"/>
@@ -5260,7 +5260,7 @@
         <p:spPr>
           <a:xfrm>
             <a:off x="4718160" y="0"/>
-            <a:ext cx="7470360" cy="6854760"/>
+            <a:ext cx="7469640" cy="6854040"/>
           </a:xfrm>
           <a:prstGeom prst="rect">
             <a:avLst/>
@@ -5298,7 +5298,7 @@
         <p:spPr>
           <a:xfrm rot="5400000">
             <a:off x="1257120" y="3396960"/>
-            <a:ext cx="6854760" cy="60840"/>
+            <a:ext cx="6854040" cy="60120"/>
           </a:xfrm>
           <a:prstGeom prst="rect">
             <a:avLst/>
@@ -5334,7 +5334,7 @@
         <p:spPr>
           <a:xfrm>
             <a:off x="0" y="0"/>
-            <a:ext cx="12185640" cy="6854760"/>
+            <a:ext cx="12184920" cy="6854040"/>
           </a:xfrm>
           <a:prstGeom prst="rect">
             <a:avLst/>
@@ -5370,7 +5370,7 @@
         <p:spPr>
           <a:xfrm>
             <a:off x="0" y="3960"/>
-            <a:ext cx="12188880" cy="1344600"/>
+            <a:ext cx="12188160" cy="1343880"/>
           </a:xfrm>
           <a:prstGeom prst="rect">
             <a:avLst/>
@@ -5406,7 +5406,7 @@
         <p:spPr>
           <a:xfrm>
             <a:off x="0" y="1351440"/>
-            <a:ext cx="12188880" cy="4746240"/>
+            <a:ext cx="12188160" cy="4745520"/>
           </a:xfrm>
           <a:prstGeom prst="rect">
             <a:avLst/>
@@ -5444,7 +5444,7 @@
         <p:spPr>
           <a:xfrm>
             <a:off x="0" y="6107760"/>
-            <a:ext cx="4647960" cy="747000"/>
+            <a:ext cx="4647240" cy="746280"/>
           </a:xfrm>
           <a:prstGeom prst="rect">
             <a:avLst/>
@@ -5480,7 +5480,7 @@
         <p:spPr>
           <a:xfrm>
             <a:off x="1440" y="6101280"/>
-            <a:ext cx="12185640" cy="60840"/>
+            <a:ext cx="12184920" cy="60120"/>
           </a:xfrm>
           <a:prstGeom prst="rect">
             <a:avLst/>
@@ -5516,7 +5516,7 @@
         <p:spPr>
           <a:xfrm>
             <a:off x="4633920" y="6117480"/>
-            <a:ext cx="60840" cy="737280"/>
+            <a:ext cx="60120" cy="736560"/>
           </a:xfrm>
           <a:prstGeom prst="rect">
             <a:avLst/>
@@ -5556,7 +5556,7 @@
         <p:spPr>
           <a:xfrm>
             <a:off x="642960" y="6309360"/>
-            <a:ext cx="3420720" cy="453960"/>
+            <a:ext cx="3420000" cy="453240"/>
           </a:xfrm>
           <a:prstGeom prst="rect">
             <a:avLst/>
@@ -5576,7 +5576,7 @@
                 <a:spcPct val="100000"/>
               </a:lnSpc>
               <a:buNone/>
-              <a:defRPr b="0" lang="en-GB" sz="1200" spc="126" strike="noStrike">
+              <a:defRPr b="0" lang="en-GB" sz="1200" spc="120" strike="noStrike">
                 <a:solidFill>
                   <a:srgbClr val="ffffff"/>
                 </a:solidFill>
@@ -5592,7 +5592,7 @@
               <a:buNone/>
             </a:pPr>
             <a:r>
-              <a:rPr b="0" lang="en-GB" sz="1200" spc="126" strike="noStrike">
+              <a:rPr b="0" lang="en-GB" sz="1200" spc="120" strike="noStrike">
                 <a:solidFill>
                   <a:srgbClr val="ffffff"/>
                 </a:solidFill>
@@ -5619,7 +5619,7 @@
         <p:spPr>
           <a:xfrm>
             <a:off x="10569240" y="6309360"/>
-            <a:ext cx="976680" cy="453960"/>
+            <a:ext cx="975960" cy="453240"/>
           </a:xfrm>
           <a:prstGeom prst="rect">
             <a:avLst/>
@@ -5639,7 +5639,7 @@
                 <a:spcPct val="100000"/>
               </a:lnSpc>
               <a:buNone/>
-              <a:defRPr b="1" lang="en-US" sz="1600" spc="126" strike="noStrike">
+              <a:defRPr b="1" lang="en-US" sz="1600" spc="120" strike="noStrike">
                 <a:solidFill>
                   <a:srgbClr val="404040"/>
                 </a:solidFill>
@@ -5654,8 +5654,8 @@
               </a:lnSpc>
               <a:buNone/>
             </a:pPr>
-            <a:fld id="{26927FF1-4FAB-45CB-832A-465A13196E39}" type="slidenum">
-              <a:rPr b="1" lang="en-US" sz="1600" spc="126" strike="noStrike">
+            <a:fld id="{826858B0-701D-43BC-8BA9-B57CB158EB0A}" type="slidenum">
+              <a:rPr b="1" lang="en-US" sz="1600" spc="120" strike="noStrike">
                 <a:solidFill>
                   <a:srgbClr val="404040"/>
                 </a:solidFill>
@@ -5682,7 +5682,7 @@
         <p:spPr>
           <a:xfrm>
             <a:off x="5373720" y="6309360"/>
-            <a:ext cx="3408840" cy="453960"/>
+            <a:ext cx="3408120" cy="453240"/>
           </a:xfrm>
           <a:prstGeom prst="rect">
             <a:avLst/>
@@ -5995,7 +5995,7 @@
         <p:spPr>
           <a:xfrm>
             <a:off x="7573680" y="0"/>
-            <a:ext cx="4614840" cy="6854760"/>
+            <a:ext cx="4614120" cy="6854040"/>
           </a:xfrm>
           <a:prstGeom prst="rect">
             <a:avLst/>
@@ -6083,7 +6083,7 @@
         <p:spPr>
           <a:xfrm rot="5400000">
             <a:off x="4101120" y="3396960"/>
-            <a:ext cx="6854760" cy="60840"/>
+            <a:ext cx="6854040" cy="60120"/>
           </a:xfrm>
           <a:prstGeom prst="rect">
             <a:avLst/>
@@ -6118,8 +6118,8 @@
         </p:nvSpPr>
         <p:spPr>
           <a:xfrm flipH="1">
-            <a:off x="719280" y="-540000"/>
-            <a:ext cx="12188880" cy="6854760"/>
+            <a:off x="718560" y="-540000"/>
+            <a:ext cx="12188160" cy="6854040"/>
           </a:xfrm>
           <a:prstGeom prst="rect">
             <a:avLst/>
@@ -6154,8 +6154,8 @@
         </p:nvSpPr>
         <p:spPr>
           <a:xfrm flipH="1">
-            <a:off x="-2880" y="0"/>
-            <a:ext cx="4422960" cy="1800720"/>
+            <a:off x="-3600" y="0"/>
+            <a:ext cx="4422240" cy="1800000"/>
           </a:xfrm>
           <a:prstGeom prst="rect">
             <a:avLst/>
@@ -6196,7 +6196,7 @@
         <p:spPr>
           <a:xfrm>
             <a:off x="0" y="1803960"/>
-            <a:ext cx="4454640" cy="4346640"/>
+            <a:ext cx="4453920" cy="4345920"/>
           </a:xfrm>
           <a:prstGeom prst="rect">
             <a:avLst/>
@@ -6214,8 +6214,8 @@
         </p:nvSpPr>
         <p:spPr>
           <a:xfrm flipH="1">
-            <a:off x="4836960" y="1335600"/>
-            <a:ext cx="7762680" cy="4424400"/>
+            <a:off x="4836240" y="1335600"/>
+            <a:ext cx="7761960" cy="4423680"/>
           </a:xfrm>
           <a:prstGeom prst="rect">
             <a:avLst/>
@@ -6257,7 +6257,7 @@
         <p:spPr>
           <a:xfrm>
             <a:off x="4881960" y="2146680"/>
-            <a:ext cx="6663600" cy="2655000"/>
+            <a:ext cx="6662880" cy="2654280"/>
           </a:xfrm>
           <a:prstGeom prst="rect">
             <a:avLst/>
@@ -6279,7 +6279,7 @@
               <a:buNone/>
             </a:pPr>
             <a:r>
-              <a:rPr b="0" lang="en-US" sz="3200" spc="126" strike="noStrike" cap="all">
+              <a:rPr b="0" lang="en-US" sz="3200" spc="120" strike="noStrike" cap="all">
                 <a:solidFill>
                   <a:srgbClr val="404040"/>
                 </a:solidFill>
@@ -6291,7 +6291,7 @@
               <a:rPr sz="3200"/>
             </a:br>
             <a:r>
-              <a:rPr b="0" lang="en-US" sz="3200" spc="126" strike="noStrike" cap="all">
+              <a:rPr b="0" lang="en-US" sz="3200" spc="120" strike="noStrike" cap="all">
                 <a:solidFill>
                   <a:srgbClr val="404040"/>
                 </a:solidFill>
@@ -6314,7 +6314,7 @@
         <p:spPr>
           <a:xfrm>
             <a:off x="1440" y="1753920"/>
-            <a:ext cx="12185640" cy="60840"/>
+            <a:ext cx="12184920" cy="60120"/>
           </a:xfrm>
           <a:prstGeom prst="rect">
             <a:avLst/>
@@ -6349,8 +6349,8 @@
         </p:nvSpPr>
         <p:spPr>
           <a:xfrm flipH="1">
-            <a:off x="-5760" y="6167520"/>
-            <a:ext cx="12188880" cy="687240"/>
+            <a:off x="-6480" y="6167520"/>
+            <a:ext cx="12188160" cy="686520"/>
           </a:xfrm>
           <a:prstGeom prst="rect">
             <a:avLst/>
@@ -6388,7 +6388,7 @@
         <p:spPr>
           <a:xfrm>
             <a:off x="1440" y="6109560"/>
-            <a:ext cx="12185640" cy="60840"/>
+            <a:ext cx="12184920" cy="60120"/>
           </a:xfrm>
           <a:prstGeom prst="rect">
             <a:avLst/>
@@ -6424,7 +6424,7 @@
         <p:spPr>
           <a:xfrm>
             <a:off x="4394160" y="0"/>
-            <a:ext cx="60840" cy="6854760"/>
+            <a:ext cx="60120" cy="6854040"/>
           </a:xfrm>
           <a:prstGeom prst="rect">
             <a:avLst/>
@@ -6464,7 +6464,7 @@
         <p:spPr>
           <a:xfrm>
             <a:off x="10569240" y="6309360"/>
-            <a:ext cx="976680" cy="453960"/>
+            <a:ext cx="975960" cy="453240"/>
           </a:xfrm>
           <a:prstGeom prst="rect">
             <a:avLst/>
@@ -6484,7 +6484,7 @@
                 <a:spcPct val="100000"/>
               </a:lnSpc>
               <a:buNone/>
-              <a:defRPr b="1" lang="en-US" sz="1600" spc="126" strike="noStrike">
+              <a:defRPr b="1" lang="en-US" sz="1600" spc="120" strike="noStrike">
                 <a:solidFill>
                   <a:srgbClr val="ffffff"/>
                 </a:solidFill>
@@ -6499,8 +6499,8 @@
               </a:lnSpc>
               <a:buNone/>
             </a:pPr>
-            <a:fld id="{C52F731E-54A5-42E7-91E3-988AE1503D6F}" type="slidenum">
-              <a:rPr b="1" lang="en-US" sz="1600" spc="126" strike="noStrike">
+            <a:fld id="{088F67D5-A81A-4798-89E4-265403EA992B}" type="slidenum">
+              <a:rPr b="1" lang="en-US" sz="1600" spc="120" strike="noStrike">
                 <a:solidFill>
                   <a:srgbClr val="ffffff"/>
                 </a:solidFill>
@@ -6557,7 +6557,7 @@
         <p:spPr>
           <a:xfrm>
             <a:off x="322560" y="180720"/>
-            <a:ext cx="11597040" cy="932400"/>
+            <a:ext cx="11596320" cy="931680"/>
           </a:xfrm>
           <a:prstGeom prst="rect">
             <a:avLst/>
@@ -6579,7 +6579,7 @@
               <a:buNone/>
             </a:pPr>
             <a:r>
-              <a:rPr b="1" lang="it-IT" sz="3600" spc="126" strike="noStrike">
+              <a:rPr b="1" lang="it-IT" sz="3600" spc="120" strike="noStrike">
                 <a:solidFill>
                   <a:srgbClr val="ffffff"/>
                 </a:solidFill>
@@ -6606,7 +6606,7 @@
         <p:spPr>
           <a:xfrm>
             <a:off x="10569240" y="6309360"/>
-            <a:ext cx="976680" cy="453960"/>
+            <a:ext cx="975960" cy="453240"/>
           </a:xfrm>
           <a:prstGeom prst="rect">
             <a:avLst/>
@@ -6626,7 +6626,7 @@
                 <a:spcPct val="100000"/>
               </a:lnSpc>
               <a:buNone/>
-              <a:defRPr b="1" lang="en-US" sz="1600" spc="126" strike="noStrike">
+              <a:defRPr b="1" lang="en-US" sz="1600" spc="120" strike="noStrike">
                 <a:solidFill>
                   <a:srgbClr val="404040"/>
                 </a:solidFill>
@@ -6641,8 +6641,8 @@
               </a:lnSpc>
               <a:buNone/>
             </a:pPr>
-            <a:fld id="{E7672E59-3DF7-4C46-B7FC-EA4509BC7F1D}" type="slidenum">
-              <a:rPr b="1" lang="en-US" sz="1600" spc="126" strike="noStrike">
+            <a:fld id="{408BCD73-806F-41C5-94DF-C79C99E8D4B1}" type="slidenum">
+              <a:rPr b="1" lang="en-US" sz="1600" spc="120" strike="noStrike">
                 <a:solidFill>
                   <a:srgbClr val="404040"/>
                 </a:solidFill>
@@ -6665,7 +6665,7 @@
         <p:spPr>
           <a:xfrm>
             <a:off x="528840" y="1441080"/>
-            <a:ext cx="11017080" cy="2149920"/>
+            <a:ext cx="11016360" cy="2149920"/>
           </a:xfrm>
           <a:prstGeom prst="rect">
             <a:avLst/>
@@ -6866,7 +6866,7 @@
         <p:spPr>
           <a:xfrm>
             <a:off x="322560" y="180720"/>
-            <a:ext cx="11597040" cy="932400"/>
+            <a:ext cx="11596320" cy="931680"/>
           </a:xfrm>
           <a:prstGeom prst="rect">
             <a:avLst/>
@@ -6888,7 +6888,7 @@
               <a:buNone/>
             </a:pPr>
             <a:r>
-              <a:rPr b="1" lang="it-IT" sz="3600" spc="126" strike="noStrike">
+              <a:rPr b="1" lang="it-IT" sz="3600" spc="120" strike="noStrike">
                 <a:solidFill>
                   <a:srgbClr val="ffffff"/>
                 </a:solidFill>
@@ -6915,7 +6915,7 @@
         <p:spPr>
           <a:xfrm>
             <a:off x="10569240" y="6309360"/>
-            <a:ext cx="976680" cy="453960"/>
+            <a:ext cx="975960" cy="453240"/>
           </a:xfrm>
           <a:prstGeom prst="rect">
             <a:avLst/>
@@ -6935,7 +6935,7 @@
                 <a:spcPct val="100000"/>
               </a:lnSpc>
               <a:buNone/>
-              <a:defRPr b="1" lang="en-US" sz="1600" spc="126" strike="noStrike">
+              <a:defRPr b="1" lang="en-US" sz="1600" spc="120" strike="noStrike">
                 <a:solidFill>
                   <a:srgbClr val="404040"/>
                 </a:solidFill>
@@ -6950,14 +6950,14 @@
               </a:lnSpc>
               <a:buNone/>
             </a:pPr>
-            <a:fld id="{51AA9902-3C33-418C-8CB8-F8B7A7AADB2D}" type="slidenum">
-              <a:rPr b="1" lang="en-US" sz="1600" spc="126" strike="noStrike">
+            <a:fld id="{71F49607-41B3-4CF2-8E8B-D2A14536FAA6}" type="slidenum">
+              <a:rPr b="1" lang="en-US" sz="1600" spc="120" strike="noStrike">
                 <a:solidFill>
                   <a:srgbClr val="404040"/>
                 </a:solidFill>
                 <a:latin typeface="Meiryo"/>
               </a:rPr>
-              <a:t>1</a:t>
+              <a:t>&lt;number&gt;</a:t>
             </a:fld>
             <a:endParaRPr b="0" lang="it-IT" sz="1600" spc="-1" strike="noStrike">
               <a:latin typeface="Times New Roman"/>
@@ -6974,7 +6974,7 @@
         <p:spPr>
           <a:xfrm>
             <a:off x="528840" y="1441080"/>
-            <a:ext cx="11017080" cy="3695040"/>
+            <a:ext cx="11016360" cy="3695040"/>
           </a:xfrm>
           <a:prstGeom prst="rect">
             <a:avLst/>
@@ -7364,7 +7364,7 @@
         <p:spPr>
           <a:xfrm>
             <a:off x="322560" y="180720"/>
-            <a:ext cx="11597040" cy="932400"/>
+            <a:ext cx="11596320" cy="931680"/>
           </a:xfrm>
           <a:prstGeom prst="rect">
             <a:avLst/>
@@ -7386,7 +7386,7 @@
               <a:buNone/>
             </a:pPr>
             <a:r>
-              <a:rPr b="1" lang="it-IT" sz="3600" spc="126" strike="noStrike">
+              <a:rPr b="1" lang="it-IT" sz="3600" spc="120" strike="noStrike">
                 <a:solidFill>
                   <a:srgbClr val="ffffff"/>
                 </a:solidFill>
@@ -7413,7 +7413,7 @@
         <p:spPr>
           <a:xfrm>
             <a:off x="10569240" y="6309360"/>
-            <a:ext cx="976680" cy="453960"/>
+            <a:ext cx="975960" cy="453240"/>
           </a:xfrm>
           <a:prstGeom prst="rect">
             <a:avLst/>
@@ -7433,7 +7433,7 @@
                 <a:spcPct val="100000"/>
               </a:lnSpc>
               <a:buNone/>
-              <a:defRPr b="1" lang="en-US" sz="1600" spc="126" strike="noStrike">
+              <a:defRPr b="1" lang="en-US" sz="1600" spc="120" strike="noStrike">
                 <a:solidFill>
                   <a:srgbClr val="404040"/>
                 </a:solidFill>
@@ -7448,14 +7448,14 @@
               </a:lnSpc>
               <a:buNone/>
             </a:pPr>
-            <a:fld id="{AA9DD5F4-470E-4EDF-B118-713B97BE2726}" type="slidenum">
-              <a:rPr b="1" lang="en-US" sz="1600" spc="126" strike="noStrike">
+            <a:fld id="{2DD42884-8521-42F6-BB88-3081773BF74D}" type="slidenum">
+              <a:rPr b="1" lang="en-US" sz="1600" spc="120" strike="noStrike">
                 <a:solidFill>
                   <a:srgbClr val="404040"/>
                 </a:solidFill>
                 <a:latin typeface="Meiryo"/>
               </a:rPr>
-              <a:t>1</a:t>
+              <a:t>&lt;number&gt;</a:t>
             </a:fld>
             <a:endParaRPr b="0" lang="it-IT" sz="1600" spc="-1" strike="noStrike">
               <a:latin typeface="Times New Roman"/>
@@ -7472,7 +7472,7 @@
         <p:spPr>
           <a:xfrm>
             <a:off x="528840" y="1441080"/>
-            <a:ext cx="11017080" cy="2938680"/>
+            <a:ext cx="11016360" cy="2938680"/>
           </a:xfrm>
           <a:prstGeom prst="rect">
             <a:avLst/>
@@ -7696,7 +7696,7 @@
         <p:spPr>
           <a:xfrm>
             <a:off x="322560" y="180720"/>
-            <a:ext cx="11597040" cy="932400"/>
+            <a:ext cx="11596320" cy="931680"/>
           </a:xfrm>
           <a:prstGeom prst="rect">
             <a:avLst/>
@@ -7718,7 +7718,7 @@
               <a:buNone/>
             </a:pPr>
             <a:r>
-              <a:rPr b="1" lang="it-IT" sz="3600" spc="126" strike="noStrike">
+              <a:rPr b="1" lang="it-IT" sz="3600" spc="120" strike="noStrike">
                 <a:solidFill>
                   <a:srgbClr val="ffffff"/>
                 </a:solidFill>
@@ -7745,7 +7745,7 @@
         <p:spPr>
           <a:xfrm>
             <a:off x="10569240" y="6309360"/>
-            <a:ext cx="976680" cy="453960"/>
+            <a:ext cx="975960" cy="453240"/>
           </a:xfrm>
           <a:prstGeom prst="rect">
             <a:avLst/>
@@ -7765,7 +7765,7 @@
                 <a:spcPct val="100000"/>
               </a:lnSpc>
               <a:buNone/>
-              <a:defRPr b="1" lang="en-US" sz="1600" spc="126" strike="noStrike">
+              <a:defRPr b="1" lang="en-US" sz="1600" spc="120" strike="noStrike">
                 <a:solidFill>
                   <a:srgbClr val="404040"/>
                 </a:solidFill>
@@ -7780,8 +7780,8 @@
               </a:lnSpc>
               <a:buNone/>
             </a:pPr>
-            <a:fld id="{51FC3D9F-80D6-44BD-9D1A-194C09AD58E2}" type="slidenum">
-              <a:rPr b="1" lang="en-US" sz="1600" spc="126" strike="noStrike">
+            <a:fld id="{AAD0E61E-6193-4D1A-9983-2F892FEE64D9}" type="slidenum">
+              <a:rPr b="1" lang="en-US" sz="1600" spc="120" strike="noStrike">
                 <a:solidFill>
                   <a:srgbClr val="404040"/>
                 </a:solidFill>
@@ -7804,7 +7804,7 @@
         <p:spPr>
           <a:xfrm>
             <a:off x="528840" y="1441080"/>
-            <a:ext cx="11017080" cy="720000"/>
+            <a:ext cx="11016360" cy="719280"/>
           </a:xfrm>
           <a:prstGeom prst="rect">
             <a:avLst/>
@@ -7872,7 +7872,7 @@
         </p:blipFill>
         <p:spPr>
           <a:xfrm>
-            <a:off x="2744280" y="342360"/>
+            <a:off x="3557160" y="342360"/>
             <a:ext cx="6702840" cy="6857640"/>
           </a:xfrm>
           <a:prstGeom prst="rect">
@@ -7926,7 +7926,7 @@
         <p:spPr>
           <a:xfrm>
             <a:off x="322560" y="180720"/>
-            <a:ext cx="11597040" cy="932400"/>
+            <a:ext cx="11596320" cy="931680"/>
           </a:xfrm>
           <a:prstGeom prst="rect">
             <a:avLst/>
@@ -7948,7 +7948,7 @@
               <a:buNone/>
             </a:pPr>
             <a:r>
-              <a:rPr b="1" lang="it-IT" sz="3600" spc="126" strike="noStrike">
+              <a:rPr b="1" lang="it-IT" sz="3600" spc="120" strike="noStrike">
                 <a:solidFill>
                   <a:srgbClr val="ffffff"/>
                 </a:solidFill>
@@ -7975,7 +7975,7 @@
         <p:spPr>
           <a:xfrm>
             <a:off x="10569240" y="6309360"/>
-            <a:ext cx="976680" cy="453960"/>
+            <a:ext cx="975960" cy="453240"/>
           </a:xfrm>
           <a:prstGeom prst="rect">
             <a:avLst/>
@@ -7995,7 +7995,7 @@
                 <a:spcPct val="100000"/>
               </a:lnSpc>
               <a:buNone/>
-              <a:defRPr b="1" lang="en-US" sz="1600" spc="126" strike="noStrike">
+              <a:defRPr b="1" lang="en-US" sz="1600" spc="120" strike="noStrike">
                 <a:solidFill>
                   <a:srgbClr val="404040"/>
                 </a:solidFill>
@@ -8010,8 +8010,8 @@
               </a:lnSpc>
               <a:buNone/>
             </a:pPr>
-            <a:fld id="{EA489399-D800-4C1C-8B07-306DB5513744}" type="slidenum">
-              <a:rPr b="1" lang="en-US" sz="1600" spc="126" strike="noStrike">
+            <a:fld id="{3E05FA7E-BFD3-42EA-B7F4-1705D5123DB9}" type="slidenum">
+              <a:rPr b="1" lang="en-US" sz="1600" spc="120" strike="noStrike">
                 <a:solidFill>
                   <a:srgbClr val="404040"/>
                 </a:solidFill>
@@ -8034,7 +8034,7 @@
         <p:spPr>
           <a:xfrm>
             <a:off x="528840" y="1441080"/>
-            <a:ext cx="11017080" cy="4911120"/>
+            <a:ext cx="11016360" cy="5240160"/>
           </a:xfrm>
           <a:prstGeom prst="rect">
             <a:avLst/>
@@ -8161,7 +8161,7 @@
                 <a:latin typeface="Meiryo"/>
                 <a:ea typeface="DejaVu Sans"/>
               </a:rPr>
-              <a:t>Cartridge and Services Purchase: prefer Fiat money over crypto using </a:t>
+              <a:t>Cartridge and Services Purchase: </a:t>
             </a:r>
             <a:r>
               <a:rPr b="0" i="1" lang="it-IT" sz="2400" spc="-1" strike="noStrike">
@@ -8181,7 +8181,7 @@
                 <a:latin typeface="Meiryo"/>
                 <a:ea typeface="DejaVu Sans"/>
               </a:rPr>
-              <a:t> solutions (alchemy, banxa, onramp.money), like Yuku.io</a:t>
+              <a:t> solutions (alchemy, banxa, ...), or even pure Fiat, off chain money</a:t>
             </a:r>
             <a:endParaRPr b="0" lang="it-IT" sz="2400" spc="-1" strike="noStrike">
               <a:latin typeface="Arial"/>
@@ -8309,7 +8309,7 @@
                 <a:latin typeface="Meiryo"/>
                 <a:ea typeface="DejaVu Sans"/>
               </a:rPr>
-              <a:t>Encryption (Vet keys?)</a:t>
+              <a:t>Encryption (Vet keys?) for data and documents</a:t>
             </a:r>
             <a:endParaRPr b="0" lang="it-IT" sz="2400" spc="-1" strike="noStrike">
               <a:latin typeface="Arial"/>
@@ -8373,26 +8373,21 @@
                 <a:latin typeface="Meiryo"/>
                 <a:ea typeface="DejaVu Sans"/>
               </a:rPr>
-              <a:t>Mint NFT of each artwork</a:t>
+              <a:t>Mint NFT of each artwork (enrich image with custom EXIF/XMP tags for DNA strings)</a:t>
             </a:r>
             <a:endParaRPr b="0" lang="it-IT" sz="2400" spc="-1" strike="noStrike">
               <a:latin typeface="Arial"/>
             </a:endParaRPr>
           </a:p>
           <a:p>
-            <a:pPr lvl="2" marL="648000" indent="-216000" algn="just">
+            <a:pPr algn="just">
               <a:lnSpc>
                 <a:spcPct val="90000"/>
               </a:lnSpc>
               <a:spcBef>
                 <a:spcPts val="451"/>
               </a:spcBef>
-              <a:buClr>
-                <a:srgbClr val="000000"/>
-              </a:buClr>
-              <a:buSzPct val="45000"/>
-              <a:buFont typeface="Wingdings" charset="2"/>
-              <a:buChar char=""/>
+              <a:buNone/>
               <a:tabLst>
                 <a:tab algn="l" pos="0"/>
               </a:tabLst>

</xml_diff>

<commit_message>
docs per demo day
</commit_message>
<xml_diff>
--- a/src/docs/presentations/21maggio.pptx
+++ b/src/docs/presentations/21maggio.pptx
@@ -14,8 +14,6 @@
     <p:sldId id="261" r:id="rId9"/>
     <p:sldId id="262" r:id="rId10"/>
     <p:sldId id="263" r:id="rId11"/>
-    <p:sldId id="264" r:id="rId12"/>
-    <p:sldId id="265" r:id="rId13"/>
   </p:sldIdLst>
   <p:sldSz cx="12192000" cy="6858000"/>
   <p:notesSz cx="7772400" cy="10058400"/>
@@ -73,7 +71,7 @@
         <p:txBody>
           <a:bodyPr/>
           <a:p>
-            <a:fld id="{863074E0-455A-45E4-A354-D8232BBCA6FF}" type="slidenum">
+            <a:fld id="{E8519FEB-57EE-4E8D-A37D-DFAF61439790}" type="slidenum">
               <a:t>&lt;#&gt;</a:t>
             </a:fld>
           </a:p>
@@ -261,7 +259,7 @@
         <p:txBody>
           <a:bodyPr/>
           <a:p>
-            <a:fld id="{F57065D8-B522-4C86-80E6-BA7CC687B089}" type="slidenum">
+            <a:fld id="{64C1C728-FC60-49E4-AEFA-C92D619E40BC}" type="slidenum">
               <a:t>&lt;#&gt;</a:t>
             </a:fld>
           </a:p>
@@ -517,7 +515,7 @@
         <p:txBody>
           <a:bodyPr/>
           <a:p>
-            <a:fld id="{057D9513-6C92-4C4B-AA6F-4010684E4E5E}" type="slidenum">
+            <a:fld id="{57BA606F-316E-49F9-B446-E926D7EF568B}" type="slidenum">
               <a:t>&lt;#&gt;</a:t>
             </a:fld>
           </a:p>
@@ -841,7 +839,7 @@
         <p:txBody>
           <a:bodyPr/>
           <a:p>
-            <a:fld id="{1D140B2F-0F1E-4232-AEF3-C03C16C419A7}" type="slidenum">
+            <a:fld id="{F583E599-62DE-4FFA-9688-8AB96E8630A5}" type="slidenum">
               <a:t>&lt;#&gt;</a:t>
             </a:fld>
           </a:p>
@@ -924,7 +922,7 @@
         <p:txBody>
           <a:bodyPr/>
           <a:p>
-            <a:fld id="{BE0664BC-C803-4602-8E73-AAD2AC0964E6}" type="slidenum">
+            <a:fld id="{2C44AF25-5BA4-43A8-9338-B42D0F3C3EBA}" type="slidenum">
               <a:t>&lt;#&gt;</a:t>
             </a:fld>
           </a:p>
@@ -1081,7 +1079,7 @@
         <p:txBody>
           <a:bodyPr/>
           <a:p>
-            <a:fld id="{F8EB849E-8441-4ADE-9B1A-4A464F7D1582}" type="slidenum">
+            <a:fld id="{A46EAFAA-C3E3-4366-B1D5-0DE76D25CD49}" type="slidenum">
               <a:t>&lt;#&gt;</a:t>
             </a:fld>
           </a:p>
@@ -1235,7 +1233,7 @@
         <p:txBody>
           <a:bodyPr/>
           <a:p>
-            <a:fld id="{D1289B67-D973-4F48-849D-7B53412DC95E}" type="slidenum">
+            <a:fld id="{7B3AD253-B33D-40C1-8574-FCF835E134C1}" type="slidenum">
               <a:t>&lt;#&gt;</a:t>
             </a:fld>
           </a:p>
@@ -1423,7 +1421,7 @@
         <p:txBody>
           <a:bodyPr/>
           <a:p>
-            <a:fld id="{89ED8464-97DD-41F3-BE8A-4900ABCF378D}" type="slidenum">
+            <a:fld id="{1B100D60-9112-44C8-A146-340351528B9D}" type="slidenum">
               <a:t>&lt;#&gt;</a:t>
             </a:fld>
           </a:p>
@@ -1543,7 +1541,7 @@
         <p:txBody>
           <a:bodyPr/>
           <a:p>
-            <a:fld id="{EB67D1FA-B83A-4277-9B56-0E07AFDD2BD6}" type="slidenum">
+            <a:fld id="{7D302645-A8DA-4159-9540-08039961485F}" type="slidenum">
               <a:t>&lt;#&gt;</a:t>
             </a:fld>
           </a:p>
@@ -1663,7 +1661,7 @@
         <p:txBody>
           <a:bodyPr/>
           <a:p>
-            <a:fld id="{8C2D766E-F64D-427F-8169-368476A8E644}" type="slidenum">
+            <a:fld id="{C44EFC64-9B9C-45B1-BDFE-B5B00F909ABB}" type="slidenum">
               <a:t>&lt;#&gt;</a:t>
             </a:fld>
           </a:p>
@@ -1885,7 +1883,7 @@
         <p:txBody>
           <a:bodyPr/>
           <a:p>
-            <a:fld id="{94D98493-705D-4973-853C-5E892B44DDB1}" type="slidenum">
+            <a:fld id="{63D13587-0B5D-4CCB-9D53-BF71CD3DF8BF}" type="slidenum">
               <a:t>&lt;#&gt;</a:t>
             </a:fld>
           </a:p>
@@ -2042,7 +2040,7 @@
         <p:txBody>
           <a:bodyPr/>
           <a:p>
-            <a:fld id="{F539432A-841C-442F-B64B-29438E1016BE}" type="slidenum">
+            <a:fld id="{E7F419F0-1629-438B-8BC5-17B567C214F3}" type="slidenum">
               <a:t>&lt;#&gt;</a:t>
             </a:fld>
           </a:p>
@@ -2264,7 +2262,7 @@
         <p:txBody>
           <a:bodyPr/>
           <a:p>
-            <a:fld id="{ADEE6D0F-75A1-40B0-BC38-8F6020EA9AED}" type="slidenum">
+            <a:fld id="{A8FCCACC-F906-4F18-8882-1E0743176F6A}" type="slidenum">
               <a:t>&lt;#&gt;</a:t>
             </a:fld>
           </a:p>
@@ -2486,7 +2484,7 @@
         <p:txBody>
           <a:bodyPr/>
           <a:p>
-            <a:fld id="{AB11FB06-6BF0-430F-91D7-71546D0693D6}" type="slidenum">
+            <a:fld id="{04B826E8-F134-4629-87B4-7E5960E93781}" type="slidenum">
               <a:t>&lt;#&gt;</a:t>
             </a:fld>
           </a:p>
@@ -2674,7 +2672,7 @@
         <p:txBody>
           <a:bodyPr/>
           <a:p>
-            <a:fld id="{103E20CD-0893-4FC8-B8E7-7A278B7077D8}" type="slidenum">
+            <a:fld id="{D6740EBF-BD8D-4C8D-89A2-4547A0ED646F}" type="slidenum">
               <a:t>&lt;#&gt;</a:t>
             </a:fld>
           </a:p>
@@ -2930,7 +2928,7 @@
         <p:txBody>
           <a:bodyPr/>
           <a:p>
-            <a:fld id="{F1AC26EC-761D-4ABF-B075-EAEA26B30208}" type="slidenum">
+            <a:fld id="{D2E0F36F-FAAA-4094-83EC-943800E74EA1}" type="slidenum">
               <a:t>&lt;#&gt;</a:t>
             </a:fld>
           </a:p>
@@ -3254,7 +3252,7 @@
         <p:txBody>
           <a:bodyPr/>
           <a:p>
-            <a:fld id="{5607CE1D-7DCE-404A-A5CA-4E10749C8EA8}" type="slidenum">
+            <a:fld id="{73BB123E-F4D4-4AC2-AEF8-330B52E91539}" type="slidenum">
               <a:t>&lt;#&gt;</a:t>
             </a:fld>
           </a:p>
@@ -3408,7 +3406,7 @@
         <p:txBody>
           <a:bodyPr/>
           <a:p>
-            <a:fld id="{D5343A0B-3F10-4651-A98B-B1F4209E9962}" type="slidenum">
+            <a:fld id="{FC9274FD-D0EF-4A44-9AA9-947CF155AFD9}" type="slidenum">
               <a:t>&lt;#&gt;</a:t>
             </a:fld>
           </a:p>
@@ -3596,7 +3594,7 @@
         <p:txBody>
           <a:bodyPr/>
           <a:p>
-            <a:fld id="{99E3F986-3196-48A8-B0C6-842C9395A3FC}" type="slidenum">
+            <a:fld id="{7EB44CA8-62EF-4970-B3CA-65B2F411D893}" type="slidenum">
               <a:t>&lt;#&gt;</a:t>
             </a:fld>
           </a:p>
@@ -3716,7 +3714,7 @@
         <p:txBody>
           <a:bodyPr/>
           <a:p>
-            <a:fld id="{3D23D78E-E08E-4C5A-9978-358FC5F02D58}" type="slidenum">
+            <a:fld id="{C9B830B5-B638-488C-B49D-2F6CC5B2B21D}" type="slidenum">
               <a:t>&lt;#&gt;</a:t>
             </a:fld>
           </a:p>
@@ -3836,7 +3834,7 @@
         <p:txBody>
           <a:bodyPr/>
           <a:p>
-            <a:fld id="{AC32B166-5F57-49EC-B520-49A67391E47C}" type="slidenum">
+            <a:fld id="{F17D445F-71C6-41E9-8E17-6F5DE494A232}" type="slidenum">
               <a:t>&lt;#&gt;</a:t>
             </a:fld>
           </a:p>
@@ -4058,7 +4056,7 @@
         <p:txBody>
           <a:bodyPr/>
           <a:p>
-            <a:fld id="{B40B6174-BB28-40BC-A98C-B9FBC742DD2D}" type="slidenum">
+            <a:fld id="{E3DD3208-4EE7-43F4-A64D-A9AB24A6790C}" type="slidenum">
               <a:t>&lt;#&gt;</a:t>
             </a:fld>
           </a:p>
@@ -4280,7 +4278,7 @@
         <p:txBody>
           <a:bodyPr/>
           <a:p>
-            <a:fld id="{EA0AE545-962F-4046-A7BB-E7E51E521E8A}" type="slidenum">
+            <a:fld id="{61468A21-A6BF-4EE9-AD6C-C24B2E261F52}" type="slidenum">
               <a:t>&lt;#&gt;</a:t>
             </a:fld>
           </a:p>
@@ -4502,7 +4500,7 @@
         <p:txBody>
           <a:bodyPr/>
           <a:p>
-            <a:fld id="{E3C77698-AEF8-4256-90F2-77903F708B18}" type="slidenum">
+            <a:fld id="{52413265-F1A2-4400-BB6D-3DAF339529DB}" type="slidenum">
               <a:t>&lt;#&gt;</a:t>
             </a:fld>
           </a:p>
@@ -4567,7 +4565,7 @@
         <p:spPr>
           <a:xfrm>
             <a:off x="4718160" y="0"/>
-            <a:ext cx="7468200" cy="6852600"/>
+            <a:ext cx="7467840" cy="6852240"/>
           </a:xfrm>
           <a:prstGeom prst="rect">
             <a:avLst/>
@@ -4597,7 +4595,7 @@
         <p:spPr>
           <a:xfrm rot="5400000">
             <a:off x="1257120" y="3396960"/>
-            <a:ext cx="6852600" cy="58680"/>
+            <a:ext cx="6852240" cy="58320"/>
           </a:xfrm>
           <a:prstGeom prst="rect">
             <a:avLst/>
@@ -4624,8 +4622,8 @@
         </p:nvSpPr>
         <p:spPr>
           <a:xfrm flipH="1">
-            <a:off x="-5760" y="0"/>
-            <a:ext cx="12186720" cy="6852600"/>
+            <a:off x="-6480" y="0"/>
+            <a:ext cx="12186360" cy="6852240"/>
           </a:xfrm>
           <a:prstGeom prst="rect">
             <a:avLst/>
@@ -4653,7 +4651,7 @@
         <p:spPr>
           <a:xfrm>
             <a:off x="0" y="825840"/>
-            <a:ext cx="6790680" cy="2588760"/>
+            <a:ext cx="6790320" cy="2588400"/>
           </a:xfrm>
           <a:prstGeom prst="rect">
             <a:avLst/>
@@ -4681,7 +4679,7 @@
         <p:spPr>
           <a:xfrm>
             <a:off x="0" y="889560"/>
-            <a:ext cx="1065240" cy="2460960"/>
+            <a:ext cx="1064880" cy="2460600"/>
           </a:xfrm>
           <a:prstGeom prst="rect">
             <a:avLst/>
@@ -4708,8 +4706,8 @@
         </p:nvSpPr>
         <p:spPr>
           <a:xfrm rot="5400000">
-            <a:off x="-2359800" y="3396960"/>
-            <a:ext cx="6852600" cy="58680"/>
+            <a:off x="-2359440" y="3396960"/>
+            <a:ext cx="6852240" cy="58320"/>
           </a:xfrm>
           <a:prstGeom prst="rect">
             <a:avLst/>
@@ -4737,7 +4735,7 @@
         <p:spPr>
           <a:xfrm rot="5400000">
             <a:off x="3398760" y="3396960"/>
-            <a:ext cx="6852600" cy="58680"/>
+            <a:ext cx="6852240" cy="58320"/>
           </a:xfrm>
           <a:prstGeom prst="rect">
             <a:avLst/>
@@ -4769,7 +4767,7 @@
         <p:spPr>
           <a:xfrm>
             <a:off x="1635120" y="6309360"/>
-            <a:ext cx="4791960" cy="451800"/>
+            <a:ext cx="4791600" cy="451440"/>
           </a:xfrm>
           <a:prstGeom prst="rect">
             <a:avLst/>
@@ -4789,7 +4787,7 @@
                 <a:spcPct val="100000"/>
               </a:lnSpc>
               <a:buNone/>
-              <a:defRPr b="0" lang="en-GB" sz="1200" spc="109" strike="noStrike">
+              <a:defRPr b="0" lang="en-GB" sz="1200" spc="106" strike="noStrike">
                 <a:solidFill>
                   <a:srgbClr val="404040"/>
                 </a:solidFill>
@@ -4805,7 +4803,7 @@
               <a:buNone/>
             </a:pPr>
             <a:r>
-              <a:rPr b="0" lang="en-GB" sz="1200" spc="109" strike="noStrike">
+              <a:rPr b="0" lang="en-GB" sz="1200" spc="106" strike="noStrike">
                 <a:solidFill>
                   <a:srgbClr val="404040"/>
                 </a:solidFill>
@@ -4832,7 +4830,7 @@
         <p:spPr>
           <a:xfrm>
             <a:off x="10569240" y="6309360"/>
-            <a:ext cx="974520" cy="451800"/>
+            <a:ext cx="974160" cy="451440"/>
           </a:xfrm>
           <a:prstGeom prst="rect">
             <a:avLst/>
@@ -4852,7 +4850,7 @@
                 <a:spcPct val="100000"/>
               </a:lnSpc>
               <a:buNone/>
-              <a:defRPr b="1" lang="en-US" sz="1600" spc="109" strike="noStrike">
+              <a:defRPr b="1" lang="en-US" sz="1600" spc="106" strike="noStrike">
                 <a:solidFill>
                   <a:srgbClr val="ffffff"/>
                 </a:solidFill>
@@ -4867,8 +4865,8 @@
               </a:lnSpc>
               <a:buNone/>
             </a:pPr>
-            <a:fld id="{DD772A8B-4167-4B54-A3EC-2CB1EE6F8FEE}" type="slidenum">
-              <a:rPr b="1" lang="en-US" sz="1600" spc="109" strike="noStrike">
+            <a:fld id="{D7458693-F2AA-4129-BFCE-CB37F0F1E9E9}" type="slidenum">
+              <a:rPr b="1" lang="en-US" sz="1600" spc="106" strike="noStrike">
                 <a:solidFill>
                   <a:srgbClr val="ffffff"/>
                 </a:solidFill>
@@ -4895,7 +4893,7 @@
         <p:spPr>
           <a:xfrm>
             <a:off x="8197200" y="6309360"/>
-            <a:ext cx="2145600" cy="451800"/>
+            <a:ext cx="2145240" cy="451440"/>
           </a:xfrm>
           <a:prstGeom prst="rect">
             <a:avLst/>
@@ -5208,7 +5206,7 @@
         <p:spPr>
           <a:xfrm>
             <a:off x="4718160" y="0"/>
-            <a:ext cx="7468200" cy="6852600"/>
+            <a:ext cx="7467840" cy="6852240"/>
           </a:xfrm>
           <a:prstGeom prst="rect">
             <a:avLst/>
@@ -5238,7 +5236,7 @@
         <p:spPr>
           <a:xfrm rot="5400000">
             <a:off x="1257120" y="3396960"/>
-            <a:ext cx="6852600" cy="58680"/>
+            <a:ext cx="6852240" cy="58320"/>
           </a:xfrm>
           <a:prstGeom prst="rect">
             <a:avLst/>
@@ -5266,7 +5264,7 @@
         <p:spPr>
           <a:xfrm>
             <a:off x="0" y="0"/>
-            <a:ext cx="12183480" cy="6852600"/>
+            <a:ext cx="12183120" cy="6852240"/>
           </a:xfrm>
           <a:prstGeom prst="rect">
             <a:avLst/>
@@ -5294,7 +5292,7 @@
         <p:spPr>
           <a:xfrm>
             <a:off x="0" y="3960"/>
-            <a:ext cx="12186720" cy="1342440"/>
+            <a:ext cx="12186360" cy="1342080"/>
           </a:xfrm>
           <a:prstGeom prst="rect">
             <a:avLst/>
@@ -5322,7 +5320,7 @@
         <p:spPr>
           <a:xfrm>
             <a:off x="0" y="1351440"/>
-            <a:ext cx="12186720" cy="4744080"/>
+            <a:ext cx="12186360" cy="4743720"/>
           </a:xfrm>
           <a:prstGeom prst="rect">
             <a:avLst/>
@@ -5352,7 +5350,7 @@
         <p:spPr>
           <a:xfrm>
             <a:off x="0" y="6107760"/>
-            <a:ext cx="4645800" cy="744840"/>
+            <a:ext cx="4645440" cy="744480"/>
           </a:xfrm>
           <a:prstGeom prst="rect">
             <a:avLst/>
@@ -5380,7 +5378,7 @@
         <p:spPr>
           <a:xfrm>
             <a:off x="1440" y="6101280"/>
-            <a:ext cx="12183480" cy="58680"/>
+            <a:ext cx="12183120" cy="58320"/>
           </a:xfrm>
           <a:prstGeom prst="rect">
             <a:avLst/>
@@ -5408,7 +5406,7 @@
         <p:spPr>
           <a:xfrm>
             <a:off x="4633920" y="6117480"/>
-            <a:ext cx="58680" cy="735120"/>
+            <a:ext cx="58320" cy="734760"/>
           </a:xfrm>
           <a:prstGeom prst="rect">
             <a:avLst/>
@@ -5440,7 +5438,7 @@
         <p:spPr>
           <a:xfrm>
             <a:off x="642960" y="6309360"/>
-            <a:ext cx="3418560" cy="451800"/>
+            <a:ext cx="3418200" cy="451440"/>
           </a:xfrm>
           <a:prstGeom prst="rect">
             <a:avLst/>
@@ -5460,7 +5458,7 @@
                 <a:spcPct val="100000"/>
               </a:lnSpc>
               <a:buNone/>
-              <a:defRPr b="0" lang="en-GB" sz="1200" spc="109" strike="noStrike">
+              <a:defRPr b="0" lang="en-GB" sz="1200" spc="106" strike="noStrike">
                 <a:solidFill>
                   <a:srgbClr val="ffffff"/>
                 </a:solidFill>
@@ -5476,7 +5474,7 @@
               <a:buNone/>
             </a:pPr>
             <a:r>
-              <a:rPr b="0" lang="en-GB" sz="1200" spc="109" strike="noStrike">
+              <a:rPr b="0" lang="en-GB" sz="1200" spc="106" strike="noStrike">
                 <a:solidFill>
                   <a:srgbClr val="ffffff"/>
                 </a:solidFill>
@@ -5503,7 +5501,7 @@
         <p:spPr>
           <a:xfrm>
             <a:off x="10569240" y="6309360"/>
-            <a:ext cx="974520" cy="451800"/>
+            <a:ext cx="974160" cy="451440"/>
           </a:xfrm>
           <a:prstGeom prst="rect">
             <a:avLst/>
@@ -5523,7 +5521,7 @@
                 <a:spcPct val="100000"/>
               </a:lnSpc>
               <a:buNone/>
-              <a:defRPr b="1" lang="en-US" sz="1600" spc="109" strike="noStrike">
+              <a:defRPr b="1" lang="en-US" sz="1600" spc="106" strike="noStrike">
                 <a:solidFill>
                   <a:srgbClr val="404040"/>
                 </a:solidFill>
@@ -5538,8 +5536,8 @@
               </a:lnSpc>
               <a:buNone/>
             </a:pPr>
-            <a:fld id="{E60DF351-64E7-4FFA-9ED4-B78D51716064}" type="slidenum">
-              <a:rPr b="1" lang="en-US" sz="1600" spc="109" strike="noStrike">
+            <a:fld id="{86576B53-826E-4646-8B47-BFF60EBF615B}" type="slidenum">
+              <a:rPr b="1" lang="en-US" sz="1600" spc="106" strike="noStrike">
                 <a:solidFill>
                   <a:srgbClr val="404040"/>
                 </a:solidFill>
@@ -5566,7 +5564,7 @@
         <p:spPr>
           <a:xfrm>
             <a:off x="5373720" y="6309360"/>
-            <a:ext cx="3406680" cy="451800"/>
+            <a:ext cx="3406320" cy="451440"/>
           </a:xfrm>
           <a:prstGeom prst="rect">
             <a:avLst/>
@@ -5879,7 +5877,7 @@
         <p:spPr>
           <a:xfrm>
             <a:off x="7573680" y="0"/>
-            <a:ext cx="4612680" cy="6852600"/>
+            <a:ext cx="4612320" cy="6852240"/>
           </a:xfrm>
           <a:prstGeom prst="rect">
             <a:avLst/>
@@ -5959,7 +5957,7 @@
         <p:spPr>
           <a:xfrm rot="5400000">
             <a:off x="4101120" y="3396960"/>
-            <a:ext cx="6852600" cy="58680"/>
+            <a:ext cx="6852240" cy="58320"/>
           </a:xfrm>
           <a:prstGeom prst="rect">
             <a:avLst/>
@@ -5986,8 +5984,8 @@
         </p:nvSpPr>
         <p:spPr>
           <a:xfrm flipH="1">
-            <a:off x="-180000" y="-540000"/>
-            <a:ext cx="12186720" cy="6852600"/>
+            <a:off x="-180720" y="-540000"/>
+            <a:ext cx="12186360" cy="6852240"/>
           </a:xfrm>
           <a:prstGeom prst="rect">
             <a:avLst/>
@@ -6014,8 +6012,8 @@
         </p:nvSpPr>
         <p:spPr>
           <a:xfrm flipH="1">
-            <a:off x="-5760" y="0"/>
-            <a:ext cx="4420800" cy="1798560"/>
+            <a:off x="-6480" y="0"/>
+            <a:ext cx="4420440" cy="1798200"/>
           </a:xfrm>
           <a:prstGeom prst="rect">
             <a:avLst/>
@@ -6048,7 +6046,7 @@
         <p:spPr>
           <a:xfrm>
             <a:off x="0" y="1803960"/>
-            <a:ext cx="4452480" cy="4344480"/>
+            <a:ext cx="4452120" cy="4344120"/>
           </a:xfrm>
           <a:prstGeom prst="rect">
             <a:avLst/>
@@ -6067,7 +6065,7 @@
         <p:spPr>
           <a:xfrm flipH="1">
             <a:off x="4452480" y="1260000"/>
-            <a:ext cx="7760520" cy="4422240"/>
+            <a:ext cx="7760160" cy="4421880"/>
           </a:xfrm>
           <a:prstGeom prst="rect">
             <a:avLst/>
@@ -6101,7 +6099,7 @@
         <p:spPr>
           <a:xfrm>
             <a:off x="4881960" y="2146680"/>
-            <a:ext cx="6661440" cy="2652840"/>
+            <a:ext cx="6661080" cy="2652480"/>
           </a:xfrm>
           <a:prstGeom prst="rect">
             <a:avLst/>
@@ -6123,7 +6121,7 @@
               <a:buNone/>
             </a:pPr>
             <a:r>
-              <a:rPr b="0" lang="en-US" sz="3200" spc="109" strike="noStrike" cap="all">
+              <a:rPr b="0" lang="en-US" sz="3200" spc="106" strike="noStrike" cap="all">
                 <a:solidFill>
                   <a:srgbClr val="404040"/>
                 </a:solidFill>
@@ -6135,7 +6133,7 @@
               <a:rPr sz="3200"/>
             </a:br>
             <a:r>
-              <a:rPr b="0" lang="en-US" sz="3200" spc="109" strike="noStrike" cap="all">
+              <a:rPr b="0" lang="en-US" sz="3200" spc="106" strike="noStrike" cap="all">
                 <a:solidFill>
                   <a:srgbClr val="404040"/>
                 </a:solidFill>
@@ -6158,7 +6156,7 @@
         <p:spPr>
           <a:xfrm>
             <a:off x="1440" y="1753920"/>
-            <a:ext cx="12183480" cy="58680"/>
+            <a:ext cx="12183120" cy="58320"/>
           </a:xfrm>
           <a:prstGeom prst="rect">
             <a:avLst/>
@@ -6185,8 +6183,8 @@
         </p:nvSpPr>
         <p:spPr>
           <a:xfrm flipH="1">
-            <a:off x="-8640" y="6167520"/>
-            <a:ext cx="12186720" cy="685080"/>
+            <a:off x="-9360" y="6167520"/>
+            <a:ext cx="12186360" cy="684720"/>
           </a:xfrm>
           <a:prstGeom prst="rect">
             <a:avLst/>
@@ -6216,7 +6214,7 @@
         <p:spPr>
           <a:xfrm>
             <a:off x="1440" y="6109560"/>
-            <a:ext cx="12183480" cy="58680"/>
+            <a:ext cx="12183120" cy="58320"/>
           </a:xfrm>
           <a:prstGeom prst="rect">
             <a:avLst/>
@@ -6244,7 +6242,7 @@
         <p:spPr>
           <a:xfrm>
             <a:off x="4394160" y="0"/>
-            <a:ext cx="58680" cy="6852600"/>
+            <a:ext cx="58320" cy="6852240"/>
           </a:xfrm>
           <a:prstGeom prst="rect">
             <a:avLst/>
@@ -6276,7 +6274,7 @@
         <p:spPr>
           <a:xfrm>
             <a:off x="10569240" y="6309360"/>
-            <a:ext cx="974520" cy="451800"/>
+            <a:ext cx="974160" cy="451440"/>
           </a:xfrm>
           <a:prstGeom prst="rect">
             <a:avLst/>
@@ -6296,7 +6294,7 @@
                 <a:spcPct val="100000"/>
               </a:lnSpc>
               <a:buNone/>
-              <a:defRPr b="1" lang="en-US" sz="1600" spc="109" strike="noStrike">
+              <a:defRPr b="1" lang="en-US" sz="1600" spc="106" strike="noStrike">
                 <a:solidFill>
                   <a:srgbClr val="ffffff"/>
                 </a:solidFill>
@@ -6311,152 +6309,10 @@
               </a:lnSpc>
               <a:buNone/>
             </a:pPr>
-            <a:fld id="{9A240508-0E5A-41C6-9A50-C8F413D307D2}" type="slidenum">
-              <a:rPr b="1" lang="en-US" sz="1600" spc="109" strike="noStrike">
+            <a:fld id="{FCF02641-C193-4A43-88D8-E6320B97A52D}" type="slidenum">
+              <a:rPr b="1" lang="en-US" sz="1600" spc="106" strike="noStrike">
                 <a:solidFill>
                   <a:srgbClr val="ffffff"/>
-                </a:solidFill>
-                <a:latin typeface="Meiryo"/>
-              </a:rPr>
-              <a:t>1</a:t>
-            </a:fld>
-            <a:endParaRPr b="0" lang="it-IT" sz="1600" spc="-1" strike="noStrike">
-              <a:latin typeface="Times New Roman"/>
-            </a:endParaRPr>
-          </a:p>
-        </p:txBody>
-      </p:sp>
-    </p:spTree>
-  </p:cSld>
-  <mc:AlternateContent>
-    <mc:Choice Requires="p14">
-      <p:transition spd="slow" p14:dur="2000"/>
-    </mc:Choice>
-    <mc:Fallback>
-      <p:transition spd="slow"/>
-    </mc:Fallback>
-  </mc:AlternateContent>
-</p:sld>
-</file>
-
-<file path=ppt/slides/slide10.xml><?xml version="1.0" encoding="utf-8"?>
-<p:sld xmlns:a="http://schemas.openxmlformats.org/drawingml/2006/main" xmlns:p="http://schemas.openxmlformats.org/presentationml/2006/main" xmlns:r="http://schemas.openxmlformats.org/officeDocument/2006/relationships" xmlns:p14="http://schemas.microsoft.com/office/powerpoint/2010/main" xmlns:p15="http://schemas.microsoft.com/office/powerpoint/2012/main" xmlns:mc="http://schemas.openxmlformats.org/markup-compatibility/2006">
-  <p:cSld>
-    <p:spTree>
-      <p:nvGrpSpPr>
-        <p:cNvPr id="1" name=""/>
-        <p:cNvGrpSpPr/>
-        <p:nvPr/>
-      </p:nvGrpSpPr>
-      <p:grpSpPr>
-        <a:xfrm>
-          <a:off x="0" y="0"/>
-          <a:ext cx="0" cy="0"/>
-          <a:chOff x="0" y="0"/>
-          <a:chExt cx="0" cy="0"/>
-        </a:xfrm>
-      </p:grpSpPr>
-      <p:sp>
-        <p:nvSpPr>
-          <p:cNvPr id="147" name="PlaceHolder 1"/>
-          <p:cNvSpPr>
-            <a:spLocks noGrp="1"/>
-          </p:cNvSpPr>
-          <p:nvPr>
-            <p:ph type="title"/>
-          </p:nvPr>
-        </p:nvSpPr>
-        <p:spPr>
-          <a:xfrm>
-            <a:off x="322560" y="180720"/>
-            <a:ext cx="11594880" cy="930240"/>
-          </a:xfrm>
-          <a:prstGeom prst="rect">
-            <a:avLst/>
-          </a:prstGeom>
-          <a:noFill/>
-          <a:ln w="0">
-            <a:noFill/>
-          </a:ln>
-        </p:spPr>
-        <p:txBody>
-          <a:bodyPr lIns="109800" rIns="109800" tIns="109800" bIns="91440" anchor="ctr">
-            <a:noAutofit/>
-          </a:bodyPr>
-          <a:p>
-            <a:pPr>
-              <a:lnSpc>
-                <a:spcPct val="150000"/>
-              </a:lnSpc>
-              <a:buNone/>
-            </a:pPr>
-            <a:r>
-              <a:rPr b="1" lang="it-IT" sz="3600" spc="109" strike="noStrike">
-                <a:solidFill>
-                  <a:srgbClr val="ffffff"/>
-                </a:solidFill>
-                <a:latin typeface="Meiryo"/>
-              </a:rPr>
-              <a:t>Final Product needs</a:t>
-            </a:r>
-            <a:endParaRPr b="0" lang="it-IT" sz="3600" spc="-1" strike="noStrike">
-              <a:latin typeface="Arial"/>
-            </a:endParaRPr>
-          </a:p>
-        </p:txBody>
-      </p:sp>
-      <p:sp>
-        <p:nvSpPr>
-          <p:cNvPr id="148" name="PlaceHolder 2"/>
-          <p:cNvSpPr>
-            <a:spLocks noGrp="1"/>
-          </p:cNvSpPr>
-          <p:nvPr>
-            <p:ph type="sldNum" idx="16"/>
-          </p:nvPr>
-        </p:nvSpPr>
-        <p:spPr>
-          <a:xfrm>
-            <a:off x="10569240" y="6309360"/>
-            <a:ext cx="974520" cy="451800"/>
-          </a:xfrm>
-          <a:prstGeom prst="rect">
-            <a:avLst/>
-          </a:prstGeom>
-          <a:noFill/>
-          <a:ln w="0">
-            <a:noFill/>
-          </a:ln>
-        </p:spPr>
-        <p:txBody>
-          <a:bodyPr lIns="109800" rIns="109800" tIns="109800" bIns="91440" anchor="b">
-            <a:noAutofit/>
-          </a:bodyPr>
-          <a:lstStyle>
-            <a:lvl1pPr algn="r">
-              <a:lnSpc>
-                <a:spcPct val="100000"/>
-              </a:lnSpc>
-              <a:buNone/>
-              <a:defRPr b="1" lang="en-US" sz="1600" spc="109" strike="noStrike">
-                <a:solidFill>
-                  <a:srgbClr val="404040"/>
-                </a:solidFill>
-                <a:latin typeface="Meiryo"/>
-              </a:defRPr>
-            </a:lvl1pPr>
-          </a:lstStyle>
-          <a:p>
-            <a:pPr algn="r">
-              <a:lnSpc>
-                <a:spcPct val="100000"/>
-              </a:lnSpc>
-              <a:buNone/>
-            </a:pPr>
-            <a:fld id="{6A7A112B-B687-4809-B6FB-C052926D557B}" type="slidenum">
-              <a:rPr b="1" lang="en-US" sz="1600" spc="109" strike="noStrike">
-                <a:solidFill>
-                  <a:srgbClr val="404040"/>
                 </a:solidFill>
                 <a:latin typeface="Meiryo"/>
               </a:rPr>
@@ -6464,396 +6320,6 @@
             </a:fld>
             <a:endParaRPr b="0" lang="it-IT" sz="1600" spc="-1" strike="noStrike">
               <a:latin typeface="Times New Roman"/>
-            </a:endParaRPr>
-          </a:p>
-        </p:txBody>
-      </p:sp>
-      <p:sp>
-        <p:nvSpPr>
-          <p:cNvPr id="149" name="CasellaDiTesto 4"/>
-          <p:cNvSpPr/>
-          <p:nvPr/>
-        </p:nvSpPr>
-        <p:spPr>
-          <a:xfrm>
-            <a:off x="528840" y="1441080"/>
-            <a:ext cx="11014920" cy="5240160"/>
-          </a:xfrm>
-          <a:prstGeom prst="rect">
-            <a:avLst/>
-          </a:prstGeom>
-          <a:noFill/>
-          <a:ln w="0">
-            <a:noFill/>
-          </a:ln>
-        </p:spPr>
-        <p:style>
-          <a:lnRef idx="0"/>
-          <a:fillRef idx="0"/>
-          <a:effectRef idx="0"/>
-          <a:fontRef idx="minor"/>
-        </p:style>
-        <p:txBody>
-          <a:bodyPr lIns="90000" rIns="90000" tIns="45000" bIns="45000" anchor="t">
-            <a:spAutoFit/>
-          </a:bodyPr>
-          <a:p>
-            <a:pPr marL="274320" indent="-228600" algn="just">
-              <a:lnSpc>
-                <a:spcPct val="90000"/>
-              </a:lnSpc>
-              <a:spcBef>
-                <a:spcPts val="451"/>
-              </a:spcBef>
-              <a:buNone/>
-              <a:tabLst>
-                <a:tab algn="l" pos="0"/>
-              </a:tabLst>
-            </a:pPr>
-            <a:endParaRPr b="0" lang="it-IT" sz="1600" spc="-1" strike="noStrike">
-              <a:latin typeface="Arial"/>
-            </a:endParaRPr>
-          </a:p>
-          <a:p>
-            <a:pPr marL="274320" indent="-228600" algn="just">
-              <a:lnSpc>
-                <a:spcPct val="90000"/>
-              </a:lnSpc>
-              <a:spcBef>
-                <a:spcPts val="451"/>
-              </a:spcBef>
-              <a:buClr>
-                <a:srgbClr val="000000"/>
-              </a:buClr>
-              <a:buSzPct val="45000"/>
-              <a:buFont typeface="Wingdings" charset="2"/>
-              <a:buChar char=""/>
-              <a:tabLst>
-                <a:tab algn="l" pos="0"/>
-              </a:tabLst>
-            </a:pPr>
-            <a:r>
-              <a:rPr b="0" lang="it-IT" sz="2400" spc="-1" strike="noStrike">
-                <a:solidFill>
-                  <a:srgbClr val="000000"/>
-                </a:solidFill>
-                <a:latin typeface="Meiryo"/>
-                <a:ea typeface="DejaVu Sans"/>
-              </a:rPr>
-              <a:t>Reduce adoption friction:</a:t>
-            </a:r>
-            <a:endParaRPr b="0" lang="it-IT" sz="2400" spc="-1" strike="noStrike">
-              <a:latin typeface="Arial"/>
-            </a:endParaRPr>
-          </a:p>
-          <a:p>
-            <a:pPr lvl="2" marL="648000" indent="-216000" algn="just">
-              <a:lnSpc>
-                <a:spcPct val="90000"/>
-              </a:lnSpc>
-              <a:spcBef>
-                <a:spcPts val="451"/>
-              </a:spcBef>
-              <a:buClr>
-                <a:srgbClr val="000000"/>
-              </a:buClr>
-              <a:buSzPct val="45000"/>
-              <a:buFont typeface="Wingdings" charset="2"/>
-              <a:buChar char=""/>
-              <a:tabLst>
-                <a:tab algn="l" pos="0"/>
-              </a:tabLst>
-            </a:pPr>
-            <a:r>
-              <a:rPr b="0" lang="it-IT" sz="2400" spc="-1" strike="noStrike">
-                <a:solidFill>
-                  <a:srgbClr val="000000"/>
-                </a:solidFill>
-                <a:latin typeface="Meiryo"/>
-                <a:ea typeface="DejaVu Sans"/>
-              </a:rPr>
-              <a:t>NFID authentication?</a:t>
-            </a:r>
-            <a:endParaRPr b="0" lang="it-IT" sz="2400" spc="-1" strike="noStrike">
-              <a:latin typeface="Arial"/>
-            </a:endParaRPr>
-          </a:p>
-          <a:p>
-            <a:pPr lvl="2" marL="648000" indent="-216000" algn="just">
-              <a:lnSpc>
-                <a:spcPct val="90000"/>
-              </a:lnSpc>
-              <a:spcBef>
-                <a:spcPts val="451"/>
-              </a:spcBef>
-              <a:buClr>
-                <a:srgbClr val="000000"/>
-              </a:buClr>
-              <a:buSzPct val="45000"/>
-              <a:buFont typeface="Wingdings" charset="2"/>
-              <a:buChar char=""/>
-              <a:tabLst>
-                <a:tab algn="l" pos="0"/>
-              </a:tabLst>
-            </a:pPr>
-            <a:r>
-              <a:rPr b="0" lang="it-IT" sz="2400" spc="-1" strike="noStrike">
-                <a:solidFill>
-                  <a:srgbClr val="000000"/>
-                </a:solidFill>
-                <a:latin typeface="Meiryo"/>
-                <a:ea typeface="DejaVu Sans"/>
-              </a:rPr>
-              <a:t>Cartridge and Services Purchase: </a:t>
-            </a:r>
-            <a:r>
-              <a:rPr b="0" i="1" lang="it-IT" sz="2400" spc="-1" strike="noStrike">
-                <a:solidFill>
-                  <a:srgbClr val="000000"/>
-                </a:solidFill>
-                <a:latin typeface="Meiryo"/>
-                <a:ea typeface="DejaVu Sans"/>
-              </a:rPr>
-              <a:t>on ramp</a:t>
-            </a:r>
-            <a:r>
-              <a:rPr b="0" lang="it-IT" sz="2400" spc="-1" strike="noStrike">
-                <a:solidFill>
-                  <a:srgbClr val="000000"/>
-                </a:solidFill>
-                <a:latin typeface="Meiryo"/>
-                <a:ea typeface="DejaVu Sans"/>
-              </a:rPr>
-              <a:t> solutions (alchemy, banxa, ...), or even pure Fiat, off chain money</a:t>
-            </a:r>
-            <a:endParaRPr b="0" lang="it-IT" sz="2400" spc="-1" strike="noStrike">
-              <a:latin typeface="Arial"/>
-            </a:endParaRPr>
-          </a:p>
-          <a:p>
-            <a:pPr lvl="2" marL="648000" indent="-216000" algn="just">
-              <a:lnSpc>
-                <a:spcPct val="90000"/>
-              </a:lnSpc>
-              <a:spcBef>
-                <a:spcPts val="451"/>
-              </a:spcBef>
-              <a:buClr>
-                <a:srgbClr val="000000"/>
-              </a:buClr>
-              <a:buSzPct val="45000"/>
-              <a:buFont typeface="Wingdings" charset="2"/>
-              <a:buChar char=""/>
-              <a:tabLst>
-                <a:tab algn="l" pos="0"/>
-              </a:tabLst>
-            </a:pPr>
-            <a:r>
-              <a:rPr b="0" lang="it-IT" sz="2400" spc="-1" strike="noStrike">
-                <a:solidFill>
-                  <a:srgbClr val="000000"/>
-                </a:solidFill>
-                <a:latin typeface="Meiryo"/>
-                <a:ea typeface="DejaVu Sans"/>
-              </a:rPr>
-              <a:t>KYC for physical delivery of cardridges</a:t>
-            </a:r>
-            <a:endParaRPr b="0" lang="it-IT" sz="2400" spc="-1" strike="noStrike">
-              <a:latin typeface="Arial"/>
-            </a:endParaRPr>
-          </a:p>
-          <a:p>
-            <a:pPr marL="274320" indent="-228600" algn="just">
-              <a:lnSpc>
-                <a:spcPct val="90000"/>
-              </a:lnSpc>
-              <a:spcBef>
-                <a:spcPts val="451"/>
-              </a:spcBef>
-              <a:buClr>
-                <a:srgbClr val="000000"/>
-              </a:buClr>
-              <a:buSzPct val="45000"/>
-              <a:buFont typeface="Wingdings" charset="2"/>
-              <a:buChar char=""/>
-              <a:tabLst>
-                <a:tab algn="l" pos="0"/>
-              </a:tabLst>
-            </a:pPr>
-            <a:r>
-              <a:rPr b="0" lang="it-IT" sz="2400" spc="-1" strike="noStrike">
-                <a:solidFill>
-                  <a:srgbClr val="000000"/>
-                </a:solidFill>
-                <a:latin typeface="Meiryo"/>
-                <a:ea typeface="DejaVu Sans"/>
-              </a:rPr>
-              <a:t>Enforce Trust and Privacy:</a:t>
-            </a:r>
-            <a:endParaRPr b="0" lang="it-IT" sz="2400" spc="-1" strike="noStrike">
-              <a:latin typeface="Arial"/>
-            </a:endParaRPr>
-          </a:p>
-          <a:p>
-            <a:pPr lvl="1" marL="432000" indent="-216000" algn="just">
-              <a:lnSpc>
-                <a:spcPct val="90000"/>
-              </a:lnSpc>
-              <a:spcBef>
-                <a:spcPts val="451"/>
-              </a:spcBef>
-              <a:buClr>
-                <a:srgbClr val="000000"/>
-              </a:buClr>
-              <a:buSzPct val="45000"/>
-              <a:buFont typeface="Wingdings" charset="2"/>
-              <a:buChar char=""/>
-              <a:tabLst>
-                <a:tab algn="l" pos="0"/>
-              </a:tabLst>
-            </a:pPr>
-            <a:r>
-              <a:rPr b="0" lang="it-IT" sz="2400" spc="-1" strike="noStrike">
-                <a:solidFill>
-                  <a:srgbClr val="000000"/>
-                </a:solidFill>
-                <a:latin typeface="Meiryo"/>
-                <a:ea typeface="DejaVu Sans"/>
-              </a:rPr>
-              <a:t>IC Certified Assets</a:t>
-            </a:r>
-            <a:endParaRPr b="0" lang="it-IT" sz="2400" spc="-1" strike="noStrike">
-              <a:latin typeface="Arial"/>
-            </a:endParaRPr>
-          </a:p>
-          <a:p>
-            <a:pPr lvl="1" marL="432000" indent="-216000" algn="just">
-              <a:lnSpc>
-                <a:spcPct val="90000"/>
-              </a:lnSpc>
-              <a:spcBef>
-                <a:spcPts val="451"/>
-              </a:spcBef>
-              <a:buClr>
-                <a:srgbClr val="000000"/>
-              </a:buClr>
-              <a:buSzPct val="45000"/>
-              <a:buFont typeface="Wingdings" charset="2"/>
-              <a:buChar char=""/>
-              <a:tabLst>
-                <a:tab algn="l" pos="0"/>
-              </a:tabLst>
-            </a:pPr>
-            <a:r>
-              <a:rPr b="0" lang="it-IT" sz="2400" spc="-1" strike="noStrike">
-                <a:solidFill>
-                  <a:srgbClr val="000000"/>
-                </a:solidFill>
-                <a:latin typeface="Meiryo"/>
-                <a:ea typeface="DejaVu Sans"/>
-              </a:rPr>
-              <a:t>Encryption (Vet keys?) for data and documents</a:t>
-            </a:r>
-            <a:endParaRPr b="0" lang="it-IT" sz="2400" spc="-1" strike="noStrike">
-              <a:latin typeface="Arial"/>
-            </a:endParaRPr>
-          </a:p>
-          <a:p>
-            <a:pPr marL="274320" indent="-228600" algn="just">
-              <a:lnSpc>
-                <a:spcPct val="90000"/>
-              </a:lnSpc>
-              <a:spcBef>
-                <a:spcPts val="451"/>
-              </a:spcBef>
-              <a:buClr>
-                <a:srgbClr val="000000"/>
-              </a:buClr>
-              <a:buSzPct val="45000"/>
-              <a:buFont typeface="Wingdings" charset="2"/>
-              <a:buChar char=""/>
-              <a:tabLst>
-                <a:tab algn="l" pos="0"/>
-              </a:tabLst>
-            </a:pPr>
-            <a:r>
-              <a:rPr b="0" lang="it-IT" sz="2400" spc="-1" strike="noStrike">
-                <a:solidFill>
-                  <a:srgbClr val="000000"/>
-                </a:solidFill>
-                <a:latin typeface="Meiryo"/>
-                <a:ea typeface="DejaVu Sans"/>
-              </a:rPr>
-              <a:t>Enpower financial operations:</a:t>
-            </a:r>
-            <a:endParaRPr b="0" lang="it-IT" sz="2400" spc="-1" strike="noStrike">
-              <a:latin typeface="Arial"/>
-            </a:endParaRPr>
-          </a:p>
-          <a:p>
-            <a:pPr lvl="2" marL="648000" indent="-216000" algn="just">
-              <a:lnSpc>
-                <a:spcPct val="90000"/>
-              </a:lnSpc>
-              <a:spcBef>
-                <a:spcPts val="451"/>
-              </a:spcBef>
-              <a:buClr>
-                <a:srgbClr val="000000"/>
-              </a:buClr>
-              <a:buSzPct val="45000"/>
-              <a:buFont typeface="Wingdings" charset="2"/>
-              <a:buChar char=""/>
-              <a:tabLst>
-                <a:tab algn="l" pos="0"/>
-              </a:tabLst>
-            </a:pPr>
-            <a:r>
-              <a:rPr b="0" lang="it-IT" sz="2400" spc="-1" strike="noStrike">
-                <a:solidFill>
-                  <a:srgbClr val="000000"/>
-                </a:solidFill>
-                <a:latin typeface="Meiryo"/>
-                <a:ea typeface="DejaVu Sans"/>
-              </a:rPr>
-              <a:t>Mint NFT of each artwork (enrich image with custom EXIF/XMP tags for DNA strings)</a:t>
-            </a:r>
-            <a:endParaRPr b="0" lang="it-IT" sz="2400" spc="-1" strike="noStrike">
-              <a:latin typeface="Arial"/>
-            </a:endParaRPr>
-          </a:p>
-          <a:p>
-            <a:pPr algn="just">
-              <a:lnSpc>
-                <a:spcPct val="90000"/>
-              </a:lnSpc>
-              <a:spcBef>
-                <a:spcPts val="451"/>
-              </a:spcBef>
-              <a:buNone/>
-              <a:tabLst>
-                <a:tab algn="l" pos="0"/>
-              </a:tabLst>
-            </a:pPr>
-            <a:endParaRPr b="0" lang="it-IT" sz="2400" spc="-1" strike="noStrike">
-              <a:latin typeface="Arial"/>
-            </a:endParaRPr>
-          </a:p>
-          <a:p>
-            <a:pPr marL="502920" indent="-228600" algn="just">
-              <a:lnSpc>
-                <a:spcPct val="90000"/>
-              </a:lnSpc>
-              <a:spcBef>
-                <a:spcPts val="451"/>
-              </a:spcBef>
-              <a:buNone/>
-              <a:tabLst>
-                <a:tab algn="l" pos="0"/>
-              </a:tabLst>
-            </a:pPr>
-            <a:endParaRPr b="0" lang="it-IT" sz="2400" spc="-1" strike="noStrike">
-              <a:latin typeface="Arial"/>
             </a:endParaRPr>
           </a:p>
         </p:txBody>
@@ -6901,7 +6367,7 @@
         <p:spPr>
           <a:xfrm>
             <a:off x="322560" y="180720"/>
-            <a:ext cx="11594880" cy="930240"/>
+            <a:ext cx="11594520" cy="929880"/>
           </a:xfrm>
           <a:prstGeom prst="rect">
             <a:avLst/>
@@ -6923,13 +6389,13 @@
               <a:buNone/>
             </a:pPr>
             <a:r>
-              <a:rPr b="1" lang="it-IT" sz="3600" spc="109" strike="noStrike">
+              <a:rPr b="1" lang="it-IT" sz="3600" spc="106" strike="noStrike">
                 <a:solidFill>
                   <a:srgbClr val="ffffff"/>
                 </a:solidFill>
                 <a:latin typeface="Meiryo"/>
               </a:rPr>
-              <a:t>Company Mission and MVP Goal</a:t>
+              <a:t>Basic Roles</a:t>
             </a:r>
             <a:endParaRPr b="0" lang="it-IT" sz="3600" spc="-1" strike="noStrike">
               <a:latin typeface="Arial"/>
@@ -6950,7 +6416,7 @@
         <p:spPr>
           <a:xfrm>
             <a:off x="10569240" y="6309360"/>
-            <a:ext cx="974520" cy="451800"/>
+            <a:ext cx="974160" cy="451440"/>
           </a:xfrm>
           <a:prstGeom prst="rect">
             <a:avLst/>
@@ -6970,7 +6436,7 @@
                 <a:spcPct val="100000"/>
               </a:lnSpc>
               <a:buNone/>
-              <a:defRPr b="1" lang="en-US" sz="1600" spc="109" strike="noStrike">
+              <a:defRPr b="1" lang="en-US" sz="1600" spc="106" strike="noStrike">
                 <a:solidFill>
                   <a:srgbClr val="404040"/>
                 </a:solidFill>
@@ -6985,14 +6451,14 @@
               </a:lnSpc>
               <a:buNone/>
             </a:pPr>
-            <a:fld id="{D59BFA1C-FC9A-4FE7-80A1-061623BAA89A}" type="slidenum">
-              <a:rPr b="1" lang="en-US" sz="1600" spc="109" strike="noStrike">
+            <a:fld id="{7E586DE1-D206-4272-996B-E7FB2DF70059}" type="slidenum">
+              <a:rPr b="1" lang="en-US" sz="1600" spc="106" strike="noStrike">
                 <a:solidFill>
                   <a:srgbClr val="404040"/>
                 </a:solidFill>
                 <a:latin typeface="Meiryo"/>
               </a:rPr>
-              <a:t>1</a:t>
+              <a:t>&lt;number&gt;</a:t>
             </a:fld>
             <a:endParaRPr b="0" lang="it-IT" sz="1600" spc="-1" strike="noStrike">
               <a:latin typeface="Times New Roman"/>
@@ -7002,14 +6468,14 @@
       </p:sp>
       <p:sp>
         <p:nvSpPr>
-          <p:cNvPr id="112" name="CasellaDiTesto 3"/>
+          <p:cNvPr id="112" name="CasellaDiTesto 10"/>
           <p:cNvSpPr/>
           <p:nvPr/>
         </p:nvSpPr>
         <p:spPr>
           <a:xfrm>
-            <a:off x="528840" y="1441080"/>
-            <a:ext cx="11014920" cy="2865240"/>
+            <a:off x="540000" y="1111680"/>
+            <a:ext cx="11014560" cy="5256360"/>
           </a:xfrm>
           <a:prstGeom prst="rect">
             <a:avLst/>
@@ -7047,7 +6513,7 @@
             </a:endParaRPr>
           </a:p>
           <a:p>
-            <a:pPr lvl="1" marL="502920" indent="-228600" algn="just">
+            <a:pPr marL="274320" indent="-228600" algn="just">
               <a:lnSpc>
                 <a:spcPct val="90000"/>
               </a:lnSpc>
@@ -7057,48 +6523,29 @@
               <a:buClr>
                 <a:srgbClr val="000000"/>
               </a:buClr>
-              <a:buSzPct val="80000"/>
+              <a:buSzPct val="45000"/>
               <a:buFont typeface="Wingdings" charset="2"/>
-              <a:buChar char=""/>
+              <a:buChar char=""/>
               <a:tabLst>
-                <a:tab algn="l" pos="446040"/>
-                <a:tab algn="l" pos="895320"/>
-                <a:tab algn="l" pos="1344600"/>
-                <a:tab algn="l" pos="1793880"/>
-                <a:tab algn="l" pos="2243160"/>
-                <a:tab algn="l" pos="2692440"/>
-                <a:tab algn="l" pos="3141720"/>
-                <a:tab algn="l" pos="3591000"/>
-                <a:tab algn="l" pos="4040280"/>
-                <a:tab algn="l" pos="4489560"/>
-                <a:tab algn="l" pos="4938840"/>
-                <a:tab algn="l" pos="5388120"/>
-                <a:tab algn="l" pos="5837400"/>
-                <a:tab algn="l" pos="6286680"/>
-                <a:tab algn="l" pos="6735600"/>
-                <a:tab algn="l" pos="7184880"/>
-                <a:tab algn="l" pos="7634160"/>
-                <a:tab algn="l" pos="8083440"/>
-                <a:tab algn="l" pos="8532720"/>
-                <a:tab algn="l" pos="8982000"/>
+                <a:tab algn="l" pos="0"/>
               </a:tabLst>
             </a:pPr>
             <a:r>
               <a:rPr b="0" lang="it-IT" sz="2400" spc="-1" strike="noStrike">
                 <a:solidFill>
-                  <a:srgbClr val="595959"/>
+                  <a:srgbClr val="000000"/>
                 </a:solidFill>
                 <a:latin typeface="Meiryo"/>
                 <a:ea typeface="DejaVu Sans"/>
               </a:rPr>
-              <a:t>Artwork forgery is a big concern. Our aim is to create an unbreakable and unique bond between the physical artwork and its digital representation, that will help to fight fakes</a:t>
+              <a:t>Laboratory: </a:t>
             </a:r>
             <a:endParaRPr b="0" lang="it-IT" sz="2400" spc="-1" strike="noStrike">
               <a:latin typeface="Arial"/>
             </a:endParaRPr>
           </a:p>
           <a:p>
-            <a:pPr lvl="1" marL="502920" indent="-228600" algn="just">
+            <a:pPr lvl="2" marL="648000" indent="-216000" algn="just">
               <a:lnSpc>
                 <a:spcPct val="90000"/>
               </a:lnSpc>
@@ -7108,68 +6555,29 @@
               <a:buClr>
                 <a:srgbClr val="000000"/>
               </a:buClr>
-              <a:buSzPct val="80000"/>
+              <a:buSzPct val="45000"/>
               <a:buFont typeface="Wingdings" charset="2"/>
-              <a:buChar char=""/>
+              <a:buChar char=""/>
               <a:tabLst>
-                <a:tab algn="l" pos="446040"/>
-                <a:tab algn="l" pos="895320"/>
-                <a:tab algn="l" pos="1344600"/>
-                <a:tab algn="l" pos="1793880"/>
-                <a:tab algn="l" pos="2243160"/>
-                <a:tab algn="l" pos="2692440"/>
-                <a:tab algn="l" pos="3141720"/>
-                <a:tab algn="l" pos="3591000"/>
-                <a:tab algn="l" pos="4040280"/>
-                <a:tab algn="l" pos="4489560"/>
-                <a:tab algn="l" pos="4938840"/>
-                <a:tab algn="l" pos="5388120"/>
-                <a:tab algn="l" pos="5837400"/>
-                <a:tab algn="l" pos="6286680"/>
-                <a:tab algn="l" pos="6735600"/>
-                <a:tab algn="l" pos="7184880"/>
-                <a:tab algn="l" pos="7634160"/>
-                <a:tab algn="l" pos="8083440"/>
-                <a:tab algn="l" pos="8532720"/>
-                <a:tab algn="l" pos="8982000"/>
+                <a:tab algn="l" pos="0"/>
               </a:tabLst>
             </a:pPr>
             <a:r>
               <a:rPr b="0" lang="it-IT" sz="2400" spc="-1" strike="noStrike">
                 <a:solidFill>
-                  <a:srgbClr val="595959"/>
+                  <a:srgbClr val="000000"/>
                 </a:solidFill>
                 <a:latin typeface="Meiryo"/>
                 <a:ea typeface="DejaVu Sans"/>
               </a:rPr>
-              <a:t>The bond (our </a:t>
-            </a:r>
-            <a:r>
-              <a:rPr b="1" i="1" lang="it-IT" sz="2400" spc="-1" strike="noStrike">
-                <a:solidFill>
-                  <a:srgbClr val="595959"/>
-                </a:solidFill>
-                <a:latin typeface="Meiryo"/>
-                <a:ea typeface="DejaVu Sans"/>
-              </a:rPr>
-              <a:t>Signature Kit</a:t>
-            </a:r>
-            <a:r>
-              <a:rPr b="0" lang="it-IT" sz="2400" spc="-1" strike="noStrike">
-                <a:solidFill>
-                  <a:srgbClr val="595959"/>
-                </a:solidFill>
-                <a:latin typeface="Meiryo"/>
-                <a:ea typeface="DejaVu Sans"/>
-              </a:rPr>
-              <a:t>) is made up of two elements: the genetic ink on the artwork and its digital representation on the IC Blockchain</a:t>
+              <a:t>Create DNA Cartridge</a:t>
             </a:r>
             <a:endParaRPr b="0" lang="it-IT" sz="2400" spc="-1" strike="noStrike">
               <a:latin typeface="Arial"/>
             </a:endParaRPr>
           </a:p>
           <a:p>
-            <a:pPr lvl="1" marL="502920" indent="-228600" algn="just">
+            <a:pPr lvl="2" marL="648000" indent="-216000" algn="just">
               <a:lnSpc>
                 <a:spcPct val="90000"/>
               </a:lnSpc>
@@ -7179,41 +6587,243 @@
               <a:buClr>
                 <a:srgbClr val="000000"/>
               </a:buClr>
-              <a:buSzPct val="80000"/>
+              <a:buSzPct val="45000"/>
               <a:buFont typeface="Wingdings" charset="2"/>
-              <a:buChar char=""/>
+              <a:buChar char=""/>
               <a:tabLst>
-                <a:tab algn="l" pos="446040"/>
-                <a:tab algn="l" pos="895320"/>
-                <a:tab algn="l" pos="1344600"/>
-                <a:tab algn="l" pos="1793880"/>
-                <a:tab algn="l" pos="2243160"/>
-                <a:tab algn="l" pos="2692440"/>
-                <a:tab algn="l" pos="3141720"/>
-                <a:tab algn="l" pos="3591000"/>
-                <a:tab algn="l" pos="4040280"/>
-                <a:tab algn="l" pos="4489560"/>
-                <a:tab algn="l" pos="4938840"/>
-                <a:tab algn="l" pos="5388120"/>
-                <a:tab algn="l" pos="5837400"/>
-                <a:tab algn="l" pos="6286680"/>
-                <a:tab algn="l" pos="6735600"/>
-                <a:tab algn="l" pos="7184880"/>
-                <a:tab algn="l" pos="7634160"/>
-                <a:tab algn="l" pos="8083440"/>
-                <a:tab algn="l" pos="8532720"/>
-                <a:tab algn="l" pos="8982000"/>
+                <a:tab algn="l" pos="0"/>
               </a:tabLst>
             </a:pPr>
             <a:r>
               <a:rPr b="0" lang="it-IT" sz="2400" spc="-1" strike="noStrike">
                 <a:solidFill>
-                  <a:srgbClr val="595959"/>
+                  <a:srgbClr val="000000"/>
                 </a:solidFill>
                 <a:latin typeface="Meiryo"/>
                 <a:ea typeface="DejaVu Sans"/>
               </a:rPr>
-              <a:t>The MVP will focus on the application logic of this solution</a:t>
+              <a:t>Insert the DNA analysis (both xls and pdf) in BlockChain</a:t>
+            </a:r>
+            <a:endParaRPr b="0" lang="it-IT" sz="2400" spc="-1" strike="noStrike">
+              <a:latin typeface="Arial"/>
+            </a:endParaRPr>
+          </a:p>
+          <a:p>
+            <a:pPr marL="274320" indent="-228600" algn="just">
+              <a:lnSpc>
+                <a:spcPct val="90000"/>
+              </a:lnSpc>
+              <a:spcBef>
+                <a:spcPts val="451"/>
+              </a:spcBef>
+              <a:buClr>
+                <a:srgbClr val="000000"/>
+              </a:buClr>
+              <a:buSzPct val="45000"/>
+              <a:buFont typeface="Wingdings" charset="2"/>
+              <a:buChar char=""/>
+              <a:tabLst>
+                <a:tab algn="l" pos="0"/>
+              </a:tabLst>
+            </a:pPr>
+            <a:r>
+              <a:rPr b="0" lang="it-IT" sz="2400" spc="-1" strike="noStrike">
+                <a:solidFill>
+                  <a:srgbClr val="000000"/>
+                </a:solidFill>
+                <a:latin typeface="Meiryo"/>
+                <a:ea typeface="DejaVu Sans"/>
+              </a:rPr>
+              <a:t>Artwork Owner: </a:t>
+            </a:r>
+            <a:endParaRPr b="0" lang="it-IT" sz="2400" spc="-1" strike="noStrike">
+              <a:latin typeface="Arial"/>
+            </a:endParaRPr>
+          </a:p>
+          <a:p>
+            <a:pPr lvl="2" marL="648000" indent="-216000" algn="just">
+              <a:lnSpc>
+                <a:spcPct val="90000"/>
+              </a:lnSpc>
+              <a:spcBef>
+                <a:spcPts val="451"/>
+              </a:spcBef>
+              <a:buClr>
+                <a:srgbClr val="000000"/>
+              </a:buClr>
+              <a:buSzPct val="45000"/>
+              <a:buFont typeface="Wingdings" charset="2"/>
+              <a:buChar char=""/>
+              <a:tabLst>
+                <a:tab algn="l" pos="0"/>
+              </a:tabLst>
+            </a:pPr>
+            <a:r>
+              <a:rPr b="0" lang="it-IT" sz="2400" spc="-1" strike="noStrike">
+                <a:solidFill>
+                  <a:srgbClr val="000000"/>
+                </a:solidFill>
+                <a:latin typeface="Meiryo"/>
+                <a:ea typeface="DejaVu Sans"/>
+              </a:rPr>
+              <a:t>create the opera folder in BC</a:t>
+            </a:r>
+            <a:endParaRPr b="0" lang="it-IT" sz="2400" spc="-1" strike="noStrike">
+              <a:latin typeface="Arial"/>
+            </a:endParaRPr>
+          </a:p>
+          <a:p>
+            <a:pPr lvl="2" marL="648000" indent="-216000" algn="just">
+              <a:lnSpc>
+                <a:spcPct val="90000"/>
+              </a:lnSpc>
+              <a:spcBef>
+                <a:spcPts val="451"/>
+              </a:spcBef>
+              <a:buClr>
+                <a:srgbClr val="000000"/>
+              </a:buClr>
+              <a:buSzPct val="45000"/>
+              <a:buFont typeface="Wingdings" charset="2"/>
+              <a:buChar char=""/>
+              <a:tabLst>
+                <a:tab algn="l" pos="0"/>
+              </a:tabLst>
+            </a:pPr>
+            <a:r>
+              <a:rPr b="0" lang="it-IT" sz="2400" spc="-1" strike="noStrike">
+                <a:solidFill>
+                  <a:srgbClr val="000000"/>
+                </a:solidFill>
+                <a:latin typeface="Meiryo"/>
+                <a:ea typeface="DejaVu Sans"/>
+              </a:rPr>
+              <a:t>Purchase cartridges</a:t>
+            </a:r>
+            <a:endParaRPr b="0" lang="it-IT" sz="2400" spc="-1" strike="noStrike">
+              <a:latin typeface="Arial"/>
+            </a:endParaRPr>
+          </a:p>
+          <a:p>
+            <a:pPr lvl="2" marL="648000" indent="-216000" algn="just">
+              <a:lnSpc>
+                <a:spcPct val="90000"/>
+              </a:lnSpc>
+              <a:spcBef>
+                <a:spcPts val="451"/>
+              </a:spcBef>
+              <a:buClr>
+                <a:srgbClr val="000000"/>
+              </a:buClr>
+              <a:buSzPct val="45000"/>
+              <a:buFont typeface="Wingdings" charset="2"/>
+              <a:buChar char=""/>
+              <a:tabLst>
+                <a:tab algn="l" pos="0"/>
+              </a:tabLst>
+            </a:pPr>
+            <a:r>
+              <a:rPr b="0" lang="it-IT" sz="2400" spc="-1" strike="noStrike">
+                <a:solidFill>
+                  <a:srgbClr val="000000"/>
+                </a:solidFill>
+                <a:latin typeface="Meiryo"/>
+                <a:ea typeface="DejaVu Sans"/>
+              </a:rPr>
+              <a:t>Place DNA ink on the artwork</a:t>
+            </a:r>
+            <a:endParaRPr b="0" lang="it-IT" sz="2400" spc="-1" strike="noStrike">
+              <a:latin typeface="Arial"/>
+            </a:endParaRPr>
+          </a:p>
+          <a:p>
+            <a:pPr lvl="2" marL="648000" indent="-216000">
+              <a:lnSpc>
+                <a:spcPct val="100000"/>
+              </a:lnSpc>
+              <a:buClr>
+                <a:srgbClr val="000000"/>
+              </a:buClr>
+              <a:buSzPct val="45000"/>
+              <a:buFont typeface="Wingdings" charset="2"/>
+              <a:buChar char=""/>
+              <a:tabLst>
+                <a:tab algn="l" pos="0"/>
+              </a:tabLst>
+            </a:pPr>
+            <a:r>
+              <a:rPr b="0" lang="it-IT" sz="2400" spc="-1" strike="noStrike">
+                <a:solidFill>
+                  <a:srgbClr val="000000"/>
+                </a:solidFill>
+                <a:latin typeface="Meiryo"/>
+                <a:ea typeface="DejaVu Sans"/>
+              </a:rPr>
+              <a:t>Insert Dna data in blockchain  (cartridge identifier and ink position on the artwork)</a:t>
+            </a:r>
+            <a:endParaRPr b="0" lang="it-IT" sz="2400" spc="-1" strike="noStrike">
+              <a:latin typeface="Arial"/>
+            </a:endParaRPr>
+          </a:p>
+          <a:p>
+            <a:pPr marL="274320" indent="-228600" algn="just">
+              <a:lnSpc>
+                <a:spcPct val="90000"/>
+              </a:lnSpc>
+              <a:spcBef>
+                <a:spcPts val="451"/>
+              </a:spcBef>
+              <a:buClr>
+                <a:srgbClr val="000000"/>
+              </a:buClr>
+              <a:buSzPct val="45000"/>
+              <a:buFont typeface="Wingdings" charset="2"/>
+              <a:buChar char=""/>
+              <a:tabLst>
+                <a:tab algn="l" pos="0"/>
+              </a:tabLst>
+            </a:pPr>
+            <a:r>
+              <a:rPr b="0" lang="it-IT" sz="2400" spc="-1" strike="noStrike">
+                <a:solidFill>
+                  <a:srgbClr val="000000"/>
+                </a:solidFill>
+                <a:latin typeface="Meiryo"/>
+                <a:ea typeface="DejaVu Sans"/>
+              </a:rPr>
+              <a:t>Artwork Stakeholder: </a:t>
+            </a:r>
+            <a:endParaRPr b="0" lang="it-IT" sz="2400" spc="-1" strike="noStrike">
+              <a:latin typeface="Arial"/>
+            </a:endParaRPr>
+          </a:p>
+          <a:p>
+            <a:pPr lvl="2" marL="648000" indent="-216000" algn="just">
+              <a:lnSpc>
+                <a:spcPct val="90000"/>
+              </a:lnSpc>
+              <a:spcBef>
+                <a:spcPts val="451"/>
+              </a:spcBef>
+              <a:buClr>
+                <a:srgbClr val="000000"/>
+              </a:buClr>
+              <a:buSzPct val="45000"/>
+              <a:buFont typeface="Wingdings" charset="2"/>
+              <a:buChar char=""/>
+              <a:tabLst>
+                <a:tab algn="l" pos="0"/>
+              </a:tabLst>
+            </a:pPr>
+            <a:r>
+              <a:rPr b="0" lang="it-IT" sz="2400" spc="-1" strike="noStrike">
+                <a:solidFill>
+                  <a:srgbClr val="000000"/>
+                </a:solidFill>
+                <a:latin typeface="Meiryo"/>
+                <a:ea typeface="DejaVu Sans"/>
+              </a:rPr>
+              <a:t>DNA verify (analysis of the swab and ink position are checked against the Blockchain record)</a:t>
             </a:r>
             <a:endParaRPr b="0" lang="it-IT" sz="2400" spc="-1" strike="noStrike">
               <a:latin typeface="Arial"/>
@@ -7281,7 +6891,7 @@
         <p:spPr>
           <a:xfrm>
             <a:off x="322560" y="180720"/>
-            <a:ext cx="11594880" cy="930240"/>
+            <a:ext cx="11594520" cy="929880"/>
           </a:xfrm>
           <a:prstGeom prst="rect">
             <a:avLst/>
@@ -7303,13 +6913,13 @@
               <a:buNone/>
             </a:pPr>
             <a:r>
-              <a:rPr b="1" lang="it-IT" sz="3600" spc="109" strike="noStrike">
+              <a:rPr b="1" lang="it-IT" sz="3600" spc="106" strike="noStrike">
                 <a:solidFill>
                   <a:srgbClr val="ffffff"/>
                 </a:solidFill>
                 <a:latin typeface="Meiryo"/>
               </a:rPr>
-              <a:t>Simplified Solution Flow</a:t>
+              <a:t>Laboratory: Create Cartridge, Analyze, Load in BC</a:t>
             </a:r>
             <a:endParaRPr b="0" lang="it-IT" sz="3600" spc="-1" strike="noStrike">
               <a:latin typeface="Arial"/>
@@ -7330,7 +6940,7 @@
         <p:spPr>
           <a:xfrm>
             <a:off x="10569240" y="6309360"/>
-            <a:ext cx="974520" cy="451800"/>
+            <a:ext cx="974160" cy="451440"/>
           </a:xfrm>
           <a:prstGeom prst="rect">
             <a:avLst/>
@@ -7350,7 +6960,7 @@
                 <a:spcPct val="100000"/>
               </a:lnSpc>
               <a:buNone/>
-              <a:defRPr b="1" lang="en-US" sz="1600" spc="109" strike="noStrike">
+              <a:defRPr b="1" lang="en-US" sz="1600" spc="106" strike="noStrike">
                 <a:solidFill>
                   <a:srgbClr val="404040"/>
                 </a:solidFill>
@@ -7365,14 +6975,14 @@
               </a:lnSpc>
               <a:buNone/>
             </a:pPr>
-            <a:fld id="{A2F544BD-A3ED-4081-9B3A-54181E826474}" type="slidenum">
-              <a:rPr b="1" lang="en-US" sz="1600" spc="109" strike="noStrike">
+            <a:fld id="{38A21FB0-6344-492C-97E0-AD4F0805CB90}" type="slidenum">
+              <a:rPr b="1" lang="en-US" sz="1600" spc="106" strike="noStrike">
                 <a:solidFill>
                   <a:srgbClr val="404040"/>
                 </a:solidFill>
                 <a:latin typeface="Meiryo"/>
               </a:rPr>
-              <a:t>1</a:t>
+              <a:t>&lt;number&gt;</a:t>
             </a:fld>
             <a:endParaRPr b="0" lang="it-IT" sz="1600" spc="-1" strike="noStrike">
               <a:latin typeface="Times New Roman"/>
@@ -7382,14 +6992,14 @@
       </p:sp>
       <p:sp>
         <p:nvSpPr>
-          <p:cNvPr id="115" name="CasellaDiTesto 10"/>
+          <p:cNvPr id="115" name="CasellaDiTesto 5"/>
           <p:cNvSpPr/>
           <p:nvPr/>
         </p:nvSpPr>
         <p:spPr>
           <a:xfrm>
-            <a:off x="540000" y="1111680"/>
-            <a:ext cx="11014920" cy="5256360"/>
+            <a:off x="528840" y="1441080"/>
+            <a:ext cx="11014560" cy="4096440"/>
           </a:xfrm>
           <a:prstGeom prst="rect">
             <a:avLst/>
@@ -7405,363 +7015,76 @@
           <a:effectRef idx="0"/>
           <a:fontRef idx="minor"/>
         </p:style>
-        <p:txBody>
-          <a:bodyPr lIns="90000" rIns="90000" tIns="45000" bIns="45000" anchor="t">
-            <a:spAutoFit/>
-          </a:bodyPr>
-          <a:p>
-            <a:pPr marL="274320" indent="-228600" algn="just">
-              <a:lnSpc>
-                <a:spcPct val="90000"/>
-              </a:lnSpc>
-              <a:spcBef>
-                <a:spcPts val="451"/>
-              </a:spcBef>
-              <a:buNone/>
-              <a:tabLst>
-                <a:tab algn="l" pos="0"/>
-              </a:tabLst>
-            </a:pPr>
-            <a:endParaRPr b="0" lang="it-IT" sz="1600" spc="-1" strike="noStrike">
-              <a:latin typeface="Arial"/>
-            </a:endParaRPr>
-          </a:p>
-          <a:p>
-            <a:pPr marL="274320" indent="-228600" algn="just">
-              <a:lnSpc>
-                <a:spcPct val="90000"/>
-              </a:lnSpc>
-              <a:spcBef>
-                <a:spcPts val="451"/>
-              </a:spcBef>
-              <a:buClr>
-                <a:srgbClr val="000000"/>
-              </a:buClr>
-              <a:buSzPct val="45000"/>
-              <a:buFont typeface="Wingdings" charset="2"/>
-              <a:buChar char=""/>
-              <a:tabLst>
-                <a:tab algn="l" pos="0"/>
-              </a:tabLst>
-            </a:pPr>
-            <a:r>
-              <a:rPr b="0" lang="it-IT" sz="2400" spc="-1" strike="noStrike">
-                <a:solidFill>
-                  <a:srgbClr val="000000"/>
-                </a:solidFill>
-                <a:latin typeface="Meiryo"/>
-                <a:ea typeface="DejaVu Sans"/>
-              </a:rPr>
-              <a:t>Laboratory: </a:t>
-            </a:r>
-            <a:endParaRPr b="0" lang="it-IT" sz="2400" spc="-1" strike="noStrike">
-              <a:latin typeface="Arial"/>
-            </a:endParaRPr>
-          </a:p>
-          <a:p>
-            <a:pPr lvl="2" marL="648000" indent="-216000" algn="just">
-              <a:lnSpc>
-                <a:spcPct val="90000"/>
-              </a:lnSpc>
-              <a:spcBef>
-                <a:spcPts val="451"/>
-              </a:spcBef>
-              <a:buClr>
-                <a:srgbClr val="000000"/>
-              </a:buClr>
-              <a:buSzPct val="45000"/>
-              <a:buFont typeface="Wingdings" charset="2"/>
-              <a:buChar char=""/>
-              <a:tabLst>
-                <a:tab algn="l" pos="0"/>
-              </a:tabLst>
-            </a:pPr>
-            <a:r>
-              <a:rPr b="0" lang="it-IT" sz="2400" spc="-1" strike="noStrike">
-                <a:solidFill>
-                  <a:srgbClr val="000000"/>
-                </a:solidFill>
-                <a:latin typeface="Meiryo"/>
-                <a:ea typeface="DejaVu Sans"/>
-              </a:rPr>
-              <a:t>Create DNA Cartridge</a:t>
-            </a:r>
-            <a:endParaRPr b="0" lang="it-IT" sz="2400" spc="-1" strike="noStrike">
-              <a:latin typeface="Arial"/>
-            </a:endParaRPr>
-          </a:p>
-          <a:p>
-            <a:pPr lvl="2" marL="648000" indent="-216000" algn="just">
-              <a:lnSpc>
-                <a:spcPct val="90000"/>
-              </a:lnSpc>
-              <a:spcBef>
-                <a:spcPts val="451"/>
-              </a:spcBef>
-              <a:buClr>
-                <a:srgbClr val="000000"/>
-              </a:buClr>
-              <a:buSzPct val="45000"/>
-              <a:buFont typeface="Wingdings" charset="2"/>
-              <a:buChar char=""/>
-              <a:tabLst>
-                <a:tab algn="l" pos="0"/>
-              </a:tabLst>
-            </a:pPr>
-            <a:r>
-              <a:rPr b="0" lang="it-IT" sz="2400" spc="-1" strike="noStrike">
-                <a:solidFill>
-                  <a:srgbClr val="000000"/>
-                </a:solidFill>
-                <a:latin typeface="Meiryo"/>
-                <a:ea typeface="DejaVu Sans"/>
-              </a:rPr>
-              <a:t>Insert the DNA analysis (both xls and pdf) in BlockChain</a:t>
-            </a:r>
-            <a:endParaRPr b="0" lang="it-IT" sz="2400" spc="-1" strike="noStrike">
-              <a:latin typeface="Arial"/>
-            </a:endParaRPr>
-          </a:p>
-          <a:p>
-            <a:pPr marL="274320" indent="-228600" algn="just">
-              <a:lnSpc>
-                <a:spcPct val="90000"/>
-              </a:lnSpc>
-              <a:spcBef>
-                <a:spcPts val="451"/>
-              </a:spcBef>
-              <a:buClr>
-                <a:srgbClr val="000000"/>
-              </a:buClr>
-              <a:buSzPct val="45000"/>
-              <a:buFont typeface="Wingdings" charset="2"/>
-              <a:buChar char=""/>
-              <a:tabLst>
-                <a:tab algn="l" pos="0"/>
-              </a:tabLst>
-            </a:pPr>
-            <a:r>
-              <a:rPr b="0" lang="it-IT" sz="2400" spc="-1" strike="noStrike">
-                <a:solidFill>
-                  <a:srgbClr val="000000"/>
-                </a:solidFill>
-                <a:latin typeface="Meiryo"/>
-                <a:ea typeface="DejaVu Sans"/>
-              </a:rPr>
-              <a:t>Artwork Owner: </a:t>
-            </a:r>
-            <a:endParaRPr b="0" lang="it-IT" sz="2400" spc="-1" strike="noStrike">
-              <a:latin typeface="Arial"/>
-            </a:endParaRPr>
-          </a:p>
-          <a:p>
-            <a:pPr lvl="2" marL="648000" indent="-216000" algn="just">
-              <a:lnSpc>
-                <a:spcPct val="90000"/>
-              </a:lnSpc>
-              <a:spcBef>
-                <a:spcPts val="451"/>
-              </a:spcBef>
-              <a:buClr>
-                <a:srgbClr val="000000"/>
-              </a:buClr>
-              <a:buSzPct val="45000"/>
-              <a:buFont typeface="Wingdings" charset="2"/>
-              <a:buChar char=""/>
-              <a:tabLst>
-                <a:tab algn="l" pos="0"/>
-              </a:tabLst>
-            </a:pPr>
-            <a:r>
-              <a:rPr b="0" lang="it-IT" sz="2400" spc="-1" strike="noStrike">
-                <a:solidFill>
-                  <a:srgbClr val="000000"/>
-                </a:solidFill>
-                <a:latin typeface="Meiryo"/>
-                <a:ea typeface="DejaVu Sans"/>
-              </a:rPr>
-              <a:t>create the opera folder in BC</a:t>
-            </a:r>
-            <a:endParaRPr b="0" lang="it-IT" sz="2400" spc="-1" strike="noStrike">
-              <a:latin typeface="Arial"/>
-            </a:endParaRPr>
-          </a:p>
-          <a:p>
-            <a:pPr lvl="2" marL="648000" indent="-216000" algn="just">
-              <a:lnSpc>
-                <a:spcPct val="90000"/>
-              </a:lnSpc>
-              <a:spcBef>
-                <a:spcPts val="451"/>
-              </a:spcBef>
-              <a:buClr>
-                <a:srgbClr val="000000"/>
-              </a:buClr>
-              <a:buSzPct val="45000"/>
-              <a:buFont typeface="Wingdings" charset="2"/>
-              <a:buChar char=""/>
-              <a:tabLst>
-                <a:tab algn="l" pos="0"/>
-              </a:tabLst>
-            </a:pPr>
-            <a:r>
-              <a:rPr b="0" lang="it-IT" sz="2400" spc="-1" strike="noStrike">
-                <a:solidFill>
-                  <a:srgbClr val="000000"/>
-                </a:solidFill>
-                <a:latin typeface="Meiryo"/>
-                <a:ea typeface="DejaVu Sans"/>
-              </a:rPr>
-              <a:t>Purchase cartridges</a:t>
-            </a:r>
-            <a:endParaRPr b="0" lang="it-IT" sz="2400" spc="-1" strike="noStrike">
-              <a:latin typeface="Arial"/>
-            </a:endParaRPr>
-          </a:p>
-          <a:p>
-            <a:pPr lvl="2" marL="648000" indent="-216000" algn="just">
-              <a:lnSpc>
-                <a:spcPct val="90000"/>
-              </a:lnSpc>
-              <a:spcBef>
-                <a:spcPts val="451"/>
-              </a:spcBef>
-              <a:buClr>
-                <a:srgbClr val="000000"/>
-              </a:buClr>
-              <a:buSzPct val="45000"/>
-              <a:buFont typeface="Wingdings" charset="2"/>
-              <a:buChar char=""/>
-              <a:tabLst>
-                <a:tab algn="l" pos="0"/>
-              </a:tabLst>
-            </a:pPr>
-            <a:r>
-              <a:rPr b="0" lang="it-IT" sz="2400" spc="-1" strike="noStrike">
-                <a:solidFill>
-                  <a:srgbClr val="000000"/>
-                </a:solidFill>
-                <a:latin typeface="Meiryo"/>
-                <a:ea typeface="DejaVu Sans"/>
-              </a:rPr>
-              <a:t>Place DNA ink on the artwork</a:t>
-            </a:r>
-            <a:endParaRPr b="0" lang="it-IT" sz="2400" spc="-1" strike="noStrike">
-              <a:latin typeface="Arial"/>
-            </a:endParaRPr>
-          </a:p>
-          <a:p>
-            <a:pPr lvl="2" marL="648000" indent="-216000">
-              <a:lnSpc>
-                <a:spcPct val="100000"/>
-              </a:lnSpc>
-              <a:buClr>
-                <a:srgbClr val="000000"/>
-              </a:buClr>
-              <a:buSzPct val="45000"/>
-              <a:buFont typeface="Wingdings" charset="2"/>
-              <a:buChar char=""/>
-              <a:tabLst>
-                <a:tab algn="l" pos="0"/>
-              </a:tabLst>
-            </a:pPr>
-            <a:r>
-              <a:rPr b="0" lang="it-IT" sz="2400" spc="-1" strike="noStrike">
-                <a:solidFill>
-                  <a:srgbClr val="000000"/>
-                </a:solidFill>
-                <a:latin typeface="Meiryo"/>
-                <a:ea typeface="DejaVu Sans"/>
-              </a:rPr>
-              <a:t>Insert Dna data in blockchain  (cartridge identifier and ink position on the artwork)</a:t>
-            </a:r>
-            <a:endParaRPr b="0" lang="it-IT" sz="2400" spc="-1" strike="noStrike">
-              <a:latin typeface="Arial"/>
-            </a:endParaRPr>
-          </a:p>
-          <a:p>
-            <a:pPr marL="274320" indent="-228600" algn="just">
-              <a:lnSpc>
-                <a:spcPct val="90000"/>
-              </a:lnSpc>
-              <a:spcBef>
-                <a:spcPts val="451"/>
-              </a:spcBef>
-              <a:buClr>
-                <a:srgbClr val="000000"/>
-              </a:buClr>
-              <a:buSzPct val="45000"/>
-              <a:buFont typeface="Wingdings" charset="2"/>
-              <a:buChar char=""/>
-              <a:tabLst>
-                <a:tab algn="l" pos="0"/>
-              </a:tabLst>
-            </a:pPr>
-            <a:r>
-              <a:rPr b="0" lang="it-IT" sz="2400" spc="-1" strike="noStrike">
-                <a:solidFill>
-                  <a:srgbClr val="000000"/>
-                </a:solidFill>
-                <a:latin typeface="Meiryo"/>
-                <a:ea typeface="DejaVu Sans"/>
-              </a:rPr>
-              <a:t>Artwork Stakeholder: </a:t>
-            </a:r>
-            <a:endParaRPr b="0" lang="it-IT" sz="2400" spc="-1" strike="noStrike">
-              <a:latin typeface="Arial"/>
-            </a:endParaRPr>
-          </a:p>
-          <a:p>
-            <a:pPr lvl="2" marL="648000" indent="-216000" algn="just">
-              <a:lnSpc>
-                <a:spcPct val="90000"/>
-              </a:lnSpc>
-              <a:spcBef>
-                <a:spcPts val="451"/>
-              </a:spcBef>
-              <a:buClr>
-                <a:srgbClr val="000000"/>
-              </a:buClr>
-              <a:buSzPct val="45000"/>
-              <a:buFont typeface="Wingdings" charset="2"/>
-              <a:buChar char=""/>
-              <a:tabLst>
-                <a:tab algn="l" pos="0"/>
-              </a:tabLst>
-            </a:pPr>
-            <a:r>
-              <a:rPr b="0" lang="it-IT" sz="2400" spc="-1" strike="noStrike">
-                <a:solidFill>
-                  <a:srgbClr val="000000"/>
-                </a:solidFill>
-                <a:latin typeface="Meiryo"/>
-                <a:ea typeface="DejaVu Sans"/>
-              </a:rPr>
-              <a:t>DNA verify (analysis of the swab and ink position are checked against the Blockchain record)</a:t>
-            </a:r>
-            <a:endParaRPr b="0" lang="it-IT" sz="2400" spc="-1" strike="noStrike">
-              <a:latin typeface="Arial"/>
-            </a:endParaRPr>
-          </a:p>
-          <a:p>
-            <a:pPr marL="502920" indent="-228600" algn="just">
-              <a:lnSpc>
-                <a:spcPct val="90000"/>
-              </a:lnSpc>
-              <a:spcBef>
-                <a:spcPts val="451"/>
-              </a:spcBef>
-              <a:buNone/>
-              <a:tabLst>
-                <a:tab algn="l" pos="0"/>
-              </a:tabLst>
-            </a:pPr>
-            <a:endParaRPr b="0" lang="it-IT" sz="2400" spc="-1" strike="noStrike">
-              <a:latin typeface="Arial"/>
-            </a:endParaRPr>
-          </a:p>
-        </p:txBody>
-      </p:sp>
+      </p:sp>
+      <p:pic>
+        <p:nvPicPr>
+          <p:cNvPr id="116" name="" descr=""/>
+          <p:cNvPicPr/>
+          <p:nvPr/>
+        </p:nvPicPr>
+        <p:blipFill>
+          <a:blip r:embed="rId1"/>
+          <a:stretch/>
+        </p:blipFill>
+        <p:spPr>
+          <a:xfrm>
+            <a:off x="0" y="1343520"/>
+            <a:ext cx="3115080" cy="3498840"/>
+          </a:xfrm>
+          <a:prstGeom prst="rect">
+            <a:avLst/>
+          </a:prstGeom>
+          <a:ln w="0">
+            <a:noFill/>
+          </a:ln>
+        </p:spPr>
+      </p:pic>
+      <p:pic>
+        <p:nvPicPr>
+          <p:cNvPr id="117" name="" descr=""/>
+          <p:cNvPicPr/>
+          <p:nvPr/>
+        </p:nvPicPr>
+        <p:blipFill>
+          <a:blip r:embed="rId2"/>
+          <a:stretch/>
+        </p:blipFill>
+        <p:spPr>
+          <a:xfrm>
+            <a:off x="2818080" y="2517840"/>
+            <a:ext cx="5821560" cy="2701800"/>
+          </a:xfrm>
+          <a:prstGeom prst="rect">
+            <a:avLst/>
+          </a:prstGeom>
+          <a:ln w="0">
+            <a:noFill/>
+          </a:ln>
+        </p:spPr>
+      </p:pic>
+      <p:pic>
+        <p:nvPicPr>
+          <p:cNvPr id="118" name="" descr=""/>
+          <p:cNvPicPr/>
+          <p:nvPr/>
+        </p:nvPicPr>
+        <p:blipFill>
+          <a:blip r:embed="rId3"/>
+          <a:stretch/>
+        </p:blipFill>
+        <p:spPr>
+          <a:xfrm>
+            <a:off x="8280000" y="3297960"/>
+            <a:ext cx="3911760" cy="2821680"/>
+          </a:xfrm>
+          <a:prstGeom prst="rect">
+            <a:avLst/>
+          </a:prstGeom>
+          <a:ln w="0">
+            <a:noFill/>
+          </a:ln>
+        </p:spPr>
+      </p:pic>
     </p:spTree>
   </p:cSld>
   <mc:AlternateContent>
@@ -7794,7 +7117,7 @@
       </p:grpSpPr>
       <p:sp>
         <p:nvSpPr>
-          <p:cNvPr id="116" name="PlaceHolder 1"/>
+          <p:cNvPr id="119" name="PlaceHolder 1"/>
           <p:cNvSpPr>
             <a:spLocks noGrp="1"/>
           </p:cNvSpPr>
@@ -7805,7 +7128,7 @@
         <p:spPr>
           <a:xfrm>
             <a:off x="322560" y="180720"/>
-            <a:ext cx="11594880" cy="930240"/>
+            <a:ext cx="11594520" cy="929880"/>
           </a:xfrm>
           <a:prstGeom prst="rect">
             <a:avLst/>
@@ -7827,13 +7150,13 @@
               <a:buNone/>
             </a:pPr>
             <a:r>
-              <a:rPr b="1" lang="it-IT" sz="3600" spc="109" strike="noStrike">
+              <a:rPr b="1" lang="it-IT" sz="3600" spc="106" strike="noStrike">
                 <a:solidFill>
                   <a:srgbClr val="ffffff"/>
                 </a:solidFill>
                 <a:latin typeface="Meiryo"/>
               </a:rPr>
-              <a:t>Laboratory: Create Cartridge, Analyze, Load in BC</a:t>
+              <a:t>Owner: Create Archive, documents and images</a:t>
             </a:r>
             <a:endParaRPr b="0" lang="it-IT" sz="3600" spc="-1" strike="noStrike">
               <a:latin typeface="Arial"/>
@@ -7843,7 +7166,7 @@
       </p:sp>
       <p:sp>
         <p:nvSpPr>
-          <p:cNvPr id="117" name="PlaceHolder 2"/>
+          <p:cNvPr id="120" name="PlaceHolder 2"/>
           <p:cNvSpPr>
             <a:spLocks noGrp="1"/>
           </p:cNvSpPr>
@@ -7854,7 +7177,7 @@
         <p:spPr>
           <a:xfrm>
             <a:off x="10569240" y="6309360"/>
-            <a:ext cx="974520" cy="451800"/>
+            <a:ext cx="974160" cy="451440"/>
           </a:xfrm>
           <a:prstGeom prst="rect">
             <a:avLst/>
@@ -7874,7 +7197,7 @@
                 <a:spcPct val="100000"/>
               </a:lnSpc>
               <a:buNone/>
-              <a:defRPr b="1" lang="en-US" sz="1600" spc="109" strike="noStrike">
+              <a:defRPr b="1" lang="en-US" sz="1600" spc="106" strike="noStrike">
                 <a:solidFill>
                   <a:srgbClr val="404040"/>
                 </a:solidFill>
@@ -7889,14 +7212,14 @@
               </a:lnSpc>
               <a:buNone/>
             </a:pPr>
-            <a:fld id="{2FF52F90-BF6A-4992-9FBA-C787A39840DF}" type="slidenum">
-              <a:rPr b="1" lang="en-US" sz="1600" spc="109" strike="noStrike">
+            <a:fld id="{568616D8-03A3-45C3-8E6B-A2A497091B1E}" type="slidenum">
+              <a:rPr b="1" lang="en-US" sz="1600" spc="106" strike="noStrike">
                 <a:solidFill>
                   <a:srgbClr val="404040"/>
                 </a:solidFill>
                 <a:latin typeface="Meiryo"/>
               </a:rPr>
-              <a:t>1</a:t>
+              <a:t>&lt;number&gt;</a:t>
             </a:fld>
             <a:endParaRPr b="0" lang="it-IT" sz="1600" spc="-1" strike="noStrike">
               <a:latin typeface="Times New Roman"/>
@@ -7906,14 +7229,14 @@
       </p:sp>
       <p:sp>
         <p:nvSpPr>
-          <p:cNvPr id="118" name="CasellaDiTesto 5"/>
+          <p:cNvPr id="121" name="CasellaDiTesto 1"/>
           <p:cNvSpPr/>
           <p:nvPr/>
         </p:nvSpPr>
         <p:spPr>
           <a:xfrm>
             <a:off x="528840" y="1441080"/>
-            <a:ext cx="11014920" cy="4096800"/>
+            <a:ext cx="11014560" cy="4096080"/>
           </a:xfrm>
           <a:prstGeom prst="rect">
             <a:avLst/>
@@ -7932,7 +7255,7 @@
       </p:sp>
       <p:pic>
         <p:nvPicPr>
-          <p:cNvPr id="119" name="" descr=""/>
+          <p:cNvPr id="122" name="" descr=""/>
           <p:cNvPicPr/>
           <p:nvPr/>
         </p:nvPicPr>
@@ -7942,8 +7265,8 @@
         </p:blipFill>
         <p:spPr>
           <a:xfrm>
-            <a:off x="0" y="1343520"/>
-            <a:ext cx="3115440" cy="3499200"/>
+            <a:off x="0" y="1440000"/>
+            <a:ext cx="6659640" cy="4663080"/>
           </a:xfrm>
           <a:prstGeom prst="rect">
             <a:avLst/>
@@ -7955,7 +7278,7 @@
       </p:pic>
       <p:pic>
         <p:nvPicPr>
-          <p:cNvPr id="120" name="" descr=""/>
+          <p:cNvPr id="123" name="" descr=""/>
           <p:cNvPicPr/>
           <p:nvPr/>
         </p:nvPicPr>
@@ -7965,31 +7288,8 @@
         </p:blipFill>
         <p:spPr>
           <a:xfrm>
-            <a:off x="2818080" y="2517840"/>
-            <a:ext cx="5821920" cy="2702160"/>
-          </a:xfrm>
-          <a:prstGeom prst="rect">
-            <a:avLst/>
-          </a:prstGeom>
-          <a:ln w="0">
-            <a:noFill/>
-          </a:ln>
-        </p:spPr>
-      </p:pic>
-      <p:pic>
-        <p:nvPicPr>
-          <p:cNvPr id="121" name="" descr=""/>
-          <p:cNvPicPr/>
-          <p:nvPr/>
-        </p:nvPicPr>
-        <p:blipFill>
-          <a:blip r:embed="rId3"/>
-          <a:stretch/>
-        </p:blipFill>
-        <p:spPr>
-          <a:xfrm>
-            <a:off x="8280000" y="3297960"/>
-            <a:ext cx="3912120" cy="2822040"/>
+            <a:off x="6705360" y="1456560"/>
+            <a:ext cx="5534280" cy="4483080"/>
           </a:xfrm>
           <a:prstGeom prst="rect">
             <a:avLst/>
@@ -8031,7 +7331,7 @@
       </p:grpSpPr>
       <p:sp>
         <p:nvSpPr>
-          <p:cNvPr id="122" name="PlaceHolder 1"/>
+          <p:cNvPr id="124" name="PlaceHolder 1"/>
           <p:cNvSpPr>
             <a:spLocks noGrp="1"/>
           </p:cNvSpPr>
@@ -8042,7 +7342,7 @@
         <p:spPr>
           <a:xfrm>
             <a:off x="322560" y="180720"/>
-            <a:ext cx="11594880" cy="930240"/>
+            <a:ext cx="11594520" cy="929880"/>
           </a:xfrm>
           <a:prstGeom prst="rect">
             <a:avLst/>
@@ -8064,23 +7364,23 @@
               <a:buNone/>
             </a:pPr>
             <a:r>
-              <a:rPr b="1" lang="it-IT" sz="3600" spc="109" strike="noStrike">
+              <a:rPr b="1" lang="it-IT" sz="2400" spc="106" strike="noStrike">
                 <a:solidFill>
                   <a:srgbClr val="ffffff"/>
                 </a:solidFill>
                 <a:latin typeface="Meiryo"/>
               </a:rPr>
-              <a:t>Owner: Create Archive, documents and images</a:t>
-            </a:r>
-            <a:endParaRPr b="0" lang="it-IT" sz="3600" spc="-1" strike="noStrike">
-              <a:latin typeface="Arial"/>
-            </a:endParaRPr>
-          </a:p>
-        </p:txBody>
-      </p:sp>
-      <p:sp>
-        <p:nvSpPr>
-          <p:cNvPr id="123" name="PlaceHolder 2"/>
+              <a:t>Owner, using the Signature Kit: put the genetic ink on the opera and in BC</a:t>
+            </a:r>
+            <a:endParaRPr b="0" lang="it-IT" sz="2400" spc="-1" strike="noStrike">
+              <a:latin typeface="Arial"/>
+            </a:endParaRPr>
+          </a:p>
+        </p:txBody>
+      </p:sp>
+      <p:sp>
+        <p:nvSpPr>
+          <p:cNvPr id="125" name="PlaceHolder 2"/>
           <p:cNvSpPr>
             <a:spLocks noGrp="1"/>
           </p:cNvSpPr>
@@ -8091,7 +7391,7 @@
         <p:spPr>
           <a:xfrm>
             <a:off x="10569240" y="6309360"/>
-            <a:ext cx="974520" cy="451800"/>
+            <a:ext cx="974160" cy="451440"/>
           </a:xfrm>
           <a:prstGeom prst="rect">
             <a:avLst/>
@@ -8111,7 +7411,7 @@
                 <a:spcPct val="100000"/>
               </a:lnSpc>
               <a:buNone/>
-              <a:defRPr b="1" lang="en-US" sz="1600" spc="109" strike="noStrike">
+              <a:defRPr b="1" lang="en-US" sz="1600" spc="106" strike="noStrike">
                 <a:solidFill>
                   <a:srgbClr val="404040"/>
                 </a:solidFill>
@@ -8126,14 +7426,14 @@
               </a:lnSpc>
               <a:buNone/>
             </a:pPr>
-            <a:fld id="{1345055F-3598-4B8B-9FD3-159BA2323D0F}" type="slidenum">
-              <a:rPr b="1" lang="en-US" sz="1600" spc="109" strike="noStrike">
+            <a:fld id="{AF177EE6-2DB5-4F0E-A587-4981DE711C1F}" type="slidenum">
+              <a:rPr b="1" lang="en-US" sz="1600" spc="106" strike="noStrike">
                 <a:solidFill>
                   <a:srgbClr val="404040"/>
                 </a:solidFill>
                 <a:latin typeface="Meiryo"/>
               </a:rPr>
-              <a:t>1</a:t>
+              <a:t>&lt;number&gt;</a:t>
             </a:fld>
             <a:endParaRPr b="0" lang="it-IT" sz="1600" spc="-1" strike="noStrike">
               <a:latin typeface="Times New Roman"/>
@@ -8143,14 +7443,14 @@
       </p:sp>
       <p:sp>
         <p:nvSpPr>
-          <p:cNvPr id="124" name="CasellaDiTesto 8"/>
+          <p:cNvPr id="126" name="CasellaDiTesto 12"/>
           <p:cNvSpPr/>
           <p:nvPr/>
         </p:nvSpPr>
         <p:spPr>
           <a:xfrm>
             <a:off x="528840" y="1441080"/>
-            <a:ext cx="11014920" cy="4096440"/>
+            <a:ext cx="11014560" cy="4096080"/>
           </a:xfrm>
           <a:prstGeom prst="rect">
             <a:avLst/>
@@ -8169,7 +7469,7 @@
       </p:sp>
       <p:pic>
         <p:nvPicPr>
-          <p:cNvPr id="125" name="" descr=""/>
+          <p:cNvPr id="127" name="" descr=""/>
           <p:cNvPicPr/>
           <p:nvPr/>
         </p:nvPicPr>
@@ -8179,8 +7479,8 @@
         </p:blipFill>
         <p:spPr>
           <a:xfrm>
-            <a:off x="0" y="1440000"/>
-            <a:ext cx="6660000" cy="4663440"/>
+            <a:off x="360000" y="1440000"/>
+            <a:ext cx="5360040" cy="4679640"/>
           </a:xfrm>
           <a:prstGeom prst="rect">
             <a:avLst/>
@@ -8192,7 +7492,7 @@
       </p:pic>
       <p:pic>
         <p:nvPicPr>
-          <p:cNvPr id="126" name="" descr=""/>
+          <p:cNvPr id="128" name="" descr=""/>
           <p:cNvPicPr/>
           <p:nvPr/>
         </p:nvPicPr>
@@ -8202,8 +7502,8 @@
         </p:blipFill>
         <p:spPr>
           <a:xfrm>
-            <a:off x="6705360" y="1456560"/>
-            <a:ext cx="5534640" cy="4483440"/>
+            <a:off x="5760000" y="1430640"/>
+            <a:ext cx="5632200" cy="4689000"/>
           </a:xfrm>
           <a:prstGeom prst="rect">
             <a:avLst/>
@@ -8245,7 +7545,7 @@
       </p:grpSpPr>
       <p:sp>
         <p:nvSpPr>
-          <p:cNvPr id="127" name="PlaceHolder 1"/>
+          <p:cNvPr id="129" name="PlaceHolder 1"/>
           <p:cNvSpPr>
             <a:spLocks noGrp="1"/>
           </p:cNvSpPr>
@@ -8256,7 +7556,7 @@
         <p:spPr>
           <a:xfrm>
             <a:off x="322560" y="180720"/>
-            <a:ext cx="11594880" cy="930240"/>
+            <a:ext cx="11594520" cy="929880"/>
           </a:xfrm>
           <a:prstGeom prst="rect">
             <a:avLst/>
@@ -8278,13 +7578,13 @@
               <a:buNone/>
             </a:pPr>
             <a:r>
-              <a:rPr b="1" lang="it-IT" sz="2400" spc="109" strike="noStrike">
+              <a:rPr b="1" lang="it-IT" sz="2400" spc="106" strike="noStrike">
                 <a:solidFill>
                   <a:srgbClr val="ffffff"/>
                 </a:solidFill>
                 <a:latin typeface="Meiryo"/>
               </a:rPr>
-              <a:t>Owner, using the Signature Kit: put the genetic ink on the opera and in BC</a:t>
+              <a:t>Verify Authenticity: Pick the DNA with a swab and analyze it</a:t>
             </a:r>
             <a:endParaRPr b="0" lang="it-IT" sz="2400" spc="-1" strike="noStrike">
               <a:latin typeface="Arial"/>
@@ -8294,7 +7594,7 @@
       </p:sp>
       <p:sp>
         <p:nvSpPr>
-          <p:cNvPr id="128" name="PlaceHolder 2"/>
+          <p:cNvPr id="130" name="PlaceHolder 2"/>
           <p:cNvSpPr>
             <a:spLocks noGrp="1"/>
           </p:cNvSpPr>
@@ -8305,7 +7605,7 @@
         <p:spPr>
           <a:xfrm>
             <a:off x="10569240" y="6309360"/>
-            <a:ext cx="974520" cy="451800"/>
+            <a:ext cx="974160" cy="451440"/>
           </a:xfrm>
           <a:prstGeom prst="rect">
             <a:avLst/>
@@ -8325,7 +7625,7 @@
                 <a:spcPct val="100000"/>
               </a:lnSpc>
               <a:buNone/>
-              <a:defRPr b="1" lang="en-US" sz="1600" spc="109" strike="noStrike">
+              <a:defRPr b="1" lang="en-US" sz="1600" spc="106" strike="noStrike">
                 <a:solidFill>
                   <a:srgbClr val="404040"/>
                 </a:solidFill>
@@ -8340,14 +7640,14 @@
               </a:lnSpc>
               <a:buNone/>
             </a:pPr>
-            <a:fld id="{CD13E6CA-B558-4616-8228-C0F08A0532EC}" type="slidenum">
-              <a:rPr b="1" lang="en-US" sz="1600" spc="109" strike="noStrike">
+            <a:fld id="{8FD67E5A-8F06-4850-A26F-0D9484F17AD6}" type="slidenum">
+              <a:rPr b="1" lang="en-US" sz="1600" spc="106" strike="noStrike">
                 <a:solidFill>
                   <a:srgbClr val="404040"/>
                 </a:solidFill>
                 <a:latin typeface="Meiryo"/>
               </a:rPr>
-              <a:t>1</a:t>
+              <a:t>&lt;number&gt;</a:t>
             </a:fld>
             <a:endParaRPr b="0" lang="it-IT" sz="1600" spc="-1" strike="noStrike">
               <a:latin typeface="Times New Roman"/>
@@ -8357,14 +7657,14 @@
       </p:sp>
       <p:sp>
         <p:nvSpPr>
-          <p:cNvPr id="129" name="CasellaDiTesto 12"/>
+          <p:cNvPr id="131" name="CasellaDiTesto 13"/>
           <p:cNvSpPr/>
           <p:nvPr/>
         </p:nvSpPr>
         <p:spPr>
           <a:xfrm>
             <a:off x="528840" y="1441080"/>
-            <a:ext cx="11014920" cy="4096440"/>
+            <a:ext cx="11014560" cy="4096080"/>
           </a:xfrm>
           <a:prstGeom prst="rect">
             <a:avLst/>
@@ -8383,7 +7683,7 @@
       </p:sp>
       <p:pic>
         <p:nvPicPr>
-          <p:cNvPr id="130" name="" descr=""/>
+          <p:cNvPr id="132" name="" descr=""/>
           <p:cNvPicPr/>
           <p:nvPr/>
         </p:nvPicPr>
@@ -8392,9 +7692,9 @@
           <a:stretch/>
         </p:blipFill>
         <p:spPr>
-          <a:xfrm>
-            <a:off x="360000" y="1440000"/>
-            <a:ext cx="5360400" cy="4680000"/>
+          <a:xfrm rot="5411400">
+            <a:off x="-370800" y="1967760"/>
+            <a:ext cx="4529880" cy="3396960"/>
           </a:xfrm>
           <a:prstGeom prst="rect">
             <a:avLst/>
@@ -8406,7 +7706,7 @@
       </p:pic>
       <p:pic>
         <p:nvPicPr>
-          <p:cNvPr id="131" name="" descr=""/>
+          <p:cNvPr id="133" name="" descr=""/>
           <p:cNvPicPr/>
           <p:nvPr/>
         </p:nvPicPr>
@@ -8416,8 +7716,8 @@
         </p:blipFill>
         <p:spPr>
           <a:xfrm>
-            <a:off x="5760000" y="1430640"/>
-            <a:ext cx="5632560" cy="4689360"/>
+            <a:off x="4212000" y="1441080"/>
+            <a:ext cx="7846560" cy="4404240"/>
           </a:xfrm>
           <a:prstGeom prst="rect">
             <a:avLst/>
@@ -8459,7 +7759,7 @@
       </p:grpSpPr>
       <p:sp>
         <p:nvSpPr>
-          <p:cNvPr id="132" name="PlaceHolder 1"/>
+          <p:cNvPr id="134" name="PlaceHolder 1"/>
           <p:cNvSpPr>
             <a:spLocks noGrp="1"/>
           </p:cNvSpPr>
@@ -8470,7 +7770,7 @@
         <p:spPr>
           <a:xfrm>
             <a:off x="322560" y="180720"/>
-            <a:ext cx="11594880" cy="930240"/>
+            <a:ext cx="11594520" cy="929880"/>
           </a:xfrm>
           <a:prstGeom prst="rect">
             <a:avLst/>
@@ -8492,23 +7792,23 @@
               <a:buNone/>
             </a:pPr>
             <a:r>
-              <a:rPr b="1" lang="it-IT" sz="2400" spc="109" strike="noStrike">
+              <a:rPr b="1" lang="it-IT" sz="3600" spc="106" strike="noStrike">
                 <a:solidFill>
                   <a:srgbClr val="ffffff"/>
                 </a:solidFill>
                 <a:latin typeface="Meiryo"/>
               </a:rPr>
-              <a:t>Verify Authenticity: Pick the DNA with a swab and analyze it</a:t>
-            </a:r>
-            <a:endParaRPr b="0" lang="it-IT" sz="2400" spc="-1" strike="noStrike">
-              <a:latin typeface="Arial"/>
-            </a:endParaRPr>
-          </a:p>
-        </p:txBody>
-      </p:sp>
-      <p:sp>
-        <p:nvSpPr>
-          <p:cNvPr id="133" name="PlaceHolder 2"/>
+              <a:t>Verify: Compare analysis with DNA in BC</a:t>
+            </a:r>
+            <a:endParaRPr b="0" lang="it-IT" sz="3600" spc="-1" strike="noStrike">
+              <a:latin typeface="Arial"/>
+            </a:endParaRPr>
+          </a:p>
+        </p:txBody>
+      </p:sp>
+      <p:sp>
+        <p:nvSpPr>
+          <p:cNvPr id="135" name="PlaceHolder 2"/>
           <p:cNvSpPr>
             <a:spLocks noGrp="1"/>
           </p:cNvSpPr>
@@ -8519,7 +7819,7 @@
         <p:spPr>
           <a:xfrm>
             <a:off x="10569240" y="6309360"/>
-            <a:ext cx="974520" cy="451800"/>
+            <a:ext cx="974160" cy="451440"/>
           </a:xfrm>
           <a:prstGeom prst="rect">
             <a:avLst/>
@@ -8539,7 +7839,7 @@
                 <a:spcPct val="100000"/>
               </a:lnSpc>
               <a:buNone/>
-              <a:defRPr b="1" lang="en-US" sz="1600" spc="109" strike="noStrike">
+              <a:defRPr b="1" lang="en-US" sz="1600" spc="106" strike="noStrike">
                 <a:solidFill>
                   <a:srgbClr val="404040"/>
                 </a:solidFill>
@@ -8554,14 +7854,14 @@
               </a:lnSpc>
               <a:buNone/>
             </a:pPr>
-            <a:fld id="{87649FCB-9801-4B14-B909-C591A9CCC124}" type="slidenum">
-              <a:rPr b="1" lang="en-US" sz="1600" spc="109" strike="noStrike">
+            <a:fld id="{3FA1AC6B-C740-4362-BBEB-2B1F54997FF7}" type="slidenum">
+              <a:rPr b="1" lang="en-US" sz="1600" spc="106" strike="noStrike">
                 <a:solidFill>
                   <a:srgbClr val="404040"/>
                 </a:solidFill>
                 <a:latin typeface="Meiryo"/>
               </a:rPr>
-              <a:t>1</a:t>
+              <a:t>&lt;number&gt;</a:t>
             </a:fld>
             <a:endParaRPr b="0" lang="it-IT" sz="1600" spc="-1" strike="noStrike">
               <a:latin typeface="Times New Roman"/>
@@ -8571,14 +7871,14 @@
       </p:sp>
       <p:sp>
         <p:nvSpPr>
-          <p:cNvPr id="134" name="CasellaDiTesto 13"/>
+          <p:cNvPr id="136" name="CasellaDiTesto 11"/>
           <p:cNvSpPr/>
           <p:nvPr/>
         </p:nvSpPr>
         <p:spPr>
           <a:xfrm>
             <a:off x="528840" y="1441080"/>
-            <a:ext cx="11014920" cy="4096440"/>
+            <a:ext cx="11014560" cy="4096080"/>
           </a:xfrm>
           <a:prstGeom prst="rect">
             <a:avLst/>
@@ -8597,7 +7897,7 @@
       </p:sp>
       <p:pic>
         <p:nvPicPr>
-          <p:cNvPr id="135" name="" descr=""/>
+          <p:cNvPr id="137" name="" descr=""/>
           <p:cNvPicPr/>
           <p:nvPr/>
         </p:nvPicPr>
@@ -8606,9 +7906,9 @@
           <a:stretch/>
         </p:blipFill>
         <p:spPr>
-          <a:xfrm rot="5411400">
-            <a:off x="-371160" y="1968120"/>
-            <a:ext cx="4530240" cy="3397320"/>
+          <a:xfrm>
+            <a:off x="7020000" y="1441080"/>
+            <a:ext cx="4318560" cy="4668120"/>
           </a:xfrm>
           <a:prstGeom prst="rect">
             <a:avLst/>
@@ -8620,7 +7920,7 @@
       </p:pic>
       <p:pic>
         <p:nvPicPr>
-          <p:cNvPr id="136" name="" descr=""/>
+          <p:cNvPr id="138" name="" descr=""/>
           <p:cNvPicPr/>
           <p:nvPr/>
         </p:nvPicPr>
@@ -8630,8 +7930,8 @@
         </p:blipFill>
         <p:spPr>
           <a:xfrm>
-            <a:off x="4212000" y="1441080"/>
-            <a:ext cx="7846920" cy="4404600"/>
+            <a:off x="180000" y="1440000"/>
+            <a:ext cx="5399640" cy="4586400"/>
           </a:xfrm>
           <a:prstGeom prst="rect">
             <a:avLst/>
@@ -8673,7 +7973,7 @@
       </p:grpSpPr>
       <p:sp>
         <p:nvSpPr>
-          <p:cNvPr id="137" name="PlaceHolder 1"/>
+          <p:cNvPr id="139" name="PlaceHolder 1"/>
           <p:cNvSpPr>
             <a:spLocks noGrp="1"/>
           </p:cNvSpPr>
@@ -8684,7 +7984,7 @@
         <p:spPr>
           <a:xfrm>
             <a:off x="322560" y="180720"/>
-            <a:ext cx="11594880" cy="930240"/>
+            <a:ext cx="11594520" cy="929880"/>
           </a:xfrm>
           <a:prstGeom prst="rect">
             <a:avLst/>
@@ -8706,13 +8006,13 @@
               <a:buNone/>
             </a:pPr>
             <a:r>
-              <a:rPr b="1" lang="it-IT" sz="3600" spc="109" strike="noStrike">
+              <a:rPr b="1" lang="it-IT" sz="3600" spc="106" strike="noStrike">
                 <a:solidFill>
                   <a:srgbClr val="ffffff"/>
                 </a:solidFill>
                 <a:latin typeface="Meiryo"/>
               </a:rPr>
-              <a:t>Verify: Compare analysis with DNA in BC</a:t>
+              <a:t>MVP Architecure</a:t>
             </a:r>
             <a:endParaRPr b="0" lang="it-IT" sz="3600" spc="-1" strike="noStrike">
               <a:latin typeface="Arial"/>
@@ -8722,7 +8022,7 @@
       </p:sp>
       <p:sp>
         <p:nvSpPr>
-          <p:cNvPr id="138" name="PlaceHolder 2"/>
+          <p:cNvPr id="140" name="PlaceHolder 2"/>
           <p:cNvSpPr>
             <a:spLocks noGrp="1"/>
           </p:cNvSpPr>
@@ -8733,7 +8033,7 @@
         <p:spPr>
           <a:xfrm>
             <a:off x="10569240" y="6309360"/>
-            <a:ext cx="974520" cy="451800"/>
+            <a:ext cx="974160" cy="451440"/>
           </a:xfrm>
           <a:prstGeom prst="rect">
             <a:avLst/>
@@ -8753,7 +8053,7 @@
                 <a:spcPct val="100000"/>
               </a:lnSpc>
               <a:buNone/>
-              <a:defRPr b="1" lang="en-US" sz="1600" spc="109" strike="noStrike">
+              <a:defRPr b="1" lang="en-US" sz="1600" spc="106" strike="noStrike">
                 <a:solidFill>
                   <a:srgbClr val="404040"/>
                 </a:solidFill>
@@ -8768,14 +8068,14 @@
               </a:lnSpc>
               <a:buNone/>
             </a:pPr>
-            <a:fld id="{B0775B41-1A58-4890-834C-885F7BE11FF6}" type="slidenum">
-              <a:rPr b="1" lang="en-US" sz="1600" spc="109" strike="noStrike">
+            <a:fld id="{C160A05A-5BFB-4541-A816-363F2721AD98}" type="slidenum">
+              <a:rPr b="1" lang="en-US" sz="1600" spc="106" strike="noStrike">
                 <a:solidFill>
                   <a:srgbClr val="404040"/>
                 </a:solidFill>
                 <a:latin typeface="Meiryo"/>
               </a:rPr>
-              <a:t>1</a:t>
+              <a:t>&lt;number&gt;</a:t>
             </a:fld>
             <a:endParaRPr b="0" lang="it-IT" sz="1600" spc="-1" strike="noStrike">
               <a:latin typeface="Times New Roman"/>
@@ -8785,228 +8085,14 @@
       </p:sp>
       <p:sp>
         <p:nvSpPr>
-          <p:cNvPr id="139" name="CasellaDiTesto 11"/>
+          <p:cNvPr id="141" name="CasellaDiTesto 2"/>
           <p:cNvSpPr/>
           <p:nvPr/>
         </p:nvSpPr>
         <p:spPr>
           <a:xfrm>
             <a:off x="528840" y="1441080"/>
-            <a:ext cx="11014920" cy="4096440"/>
-          </a:xfrm>
-          <a:prstGeom prst="rect">
-            <a:avLst/>
-          </a:prstGeom>
-          <a:noFill/>
-          <a:ln w="0">
-            <a:noFill/>
-          </a:ln>
-        </p:spPr>
-        <p:style>
-          <a:lnRef idx="0"/>
-          <a:fillRef idx="0"/>
-          <a:effectRef idx="0"/>
-          <a:fontRef idx="minor"/>
-        </p:style>
-      </p:sp>
-      <p:pic>
-        <p:nvPicPr>
-          <p:cNvPr id="140" name="" descr=""/>
-          <p:cNvPicPr/>
-          <p:nvPr/>
-        </p:nvPicPr>
-        <p:blipFill>
-          <a:blip r:embed="rId1"/>
-          <a:stretch/>
-        </p:blipFill>
-        <p:spPr>
-          <a:xfrm>
-            <a:off x="7020000" y="1441080"/>
-            <a:ext cx="4318920" cy="4668480"/>
-          </a:xfrm>
-          <a:prstGeom prst="rect">
-            <a:avLst/>
-          </a:prstGeom>
-          <a:ln w="0">
-            <a:noFill/>
-          </a:ln>
-        </p:spPr>
-      </p:pic>
-      <p:pic>
-        <p:nvPicPr>
-          <p:cNvPr id="141" name="" descr=""/>
-          <p:cNvPicPr/>
-          <p:nvPr/>
-        </p:nvPicPr>
-        <p:blipFill>
-          <a:blip r:embed="rId2"/>
-          <a:stretch/>
-        </p:blipFill>
-        <p:spPr>
-          <a:xfrm>
-            <a:off x="180000" y="1440000"/>
-            <a:ext cx="5400000" cy="4586760"/>
-          </a:xfrm>
-          <a:prstGeom prst="rect">
-            <a:avLst/>
-          </a:prstGeom>
-          <a:ln w="0">
-            <a:noFill/>
-          </a:ln>
-        </p:spPr>
-      </p:pic>
-    </p:spTree>
-  </p:cSld>
-  <mc:AlternateContent>
-    <mc:Choice Requires="p14">
-      <p:transition spd="slow" p14:dur="2000"/>
-    </mc:Choice>
-    <mc:Fallback>
-      <p:transition spd="slow"/>
-    </mc:Fallback>
-  </mc:AlternateContent>
-</p:sld>
-</file>
-
-<file path=ppt/slides/slide9.xml><?xml version="1.0" encoding="utf-8"?>
-<p:sld xmlns:a="http://schemas.openxmlformats.org/drawingml/2006/main" xmlns:p="http://schemas.openxmlformats.org/presentationml/2006/main" xmlns:r="http://schemas.openxmlformats.org/officeDocument/2006/relationships" xmlns:p14="http://schemas.microsoft.com/office/powerpoint/2010/main" xmlns:p15="http://schemas.microsoft.com/office/powerpoint/2012/main" xmlns:mc="http://schemas.openxmlformats.org/markup-compatibility/2006">
-  <p:cSld>
-    <p:spTree>
-      <p:nvGrpSpPr>
-        <p:cNvPr id="1" name=""/>
-        <p:cNvGrpSpPr/>
-        <p:nvPr/>
-      </p:nvGrpSpPr>
-      <p:grpSpPr>
-        <a:xfrm>
-          <a:off x="0" y="0"/>
-          <a:ext cx="0" cy="0"/>
-          <a:chOff x="0" y="0"/>
-          <a:chExt cx="0" cy="0"/>
-        </a:xfrm>
-      </p:grpSpPr>
-      <p:sp>
-        <p:nvSpPr>
-          <p:cNvPr id="142" name="PlaceHolder 1"/>
-          <p:cNvSpPr>
-            <a:spLocks noGrp="1"/>
-          </p:cNvSpPr>
-          <p:nvPr>
-            <p:ph type="title"/>
-          </p:nvPr>
-        </p:nvSpPr>
-        <p:spPr>
-          <a:xfrm>
-            <a:off x="322560" y="180720"/>
-            <a:ext cx="11594880" cy="930240"/>
-          </a:xfrm>
-          <a:prstGeom prst="rect">
-            <a:avLst/>
-          </a:prstGeom>
-          <a:noFill/>
-          <a:ln w="0">
-            <a:noFill/>
-          </a:ln>
-        </p:spPr>
-        <p:txBody>
-          <a:bodyPr lIns="109800" rIns="109800" tIns="109800" bIns="91440" anchor="ctr">
-            <a:noAutofit/>
-          </a:bodyPr>
-          <a:p>
-            <a:pPr>
-              <a:lnSpc>
-                <a:spcPct val="150000"/>
-              </a:lnSpc>
-              <a:buNone/>
-            </a:pPr>
-            <a:r>
-              <a:rPr b="1" lang="it-IT" sz="3600" spc="109" strike="noStrike">
-                <a:solidFill>
-                  <a:srgbClr val="ffffff"/>
-                </a:solidFill>
-                <a:latin typeface="Meiryo"/>
-              </a:rPr>
-              <a:t>MVP Architecure</a:t>
-            </a:r>
-            <a:endParaRPr b="0" lang="it-IT" sz="3600" spc="-1" strike="noStrike">
-              <a:latin typeface="Arial"/>
-            </a:endParaRPr>
-          </a:p>
-        </p:txBody>
-      </p:sp>
-      <p:sp>
-        <p:nvSpPr>
-          <p:cNvPr id="143" name="PlaceHolder 2"/>
-          <p:cNvSpPr>
-            <a:spLocks noGrp="1"/>
-          </p:cNvSpPr>
-          <p:nvPr>
-            <p:ph type="sldNum" idx="15"/>
-          </p:nvPr>
-        </p:nvSpPr>
-        <p:spPr>
-          <a:xfrm>
-            <a:off x="10569240" y="6309360"/>
-            <a:ext cx="974520" cy="451800"/>
-          </a:xfrm>
-          <a:prstGeom prst="rect">
-            <a:avLst/>
-          </a:prstGeom>
-          <a:noFill/>
-          <a:ln w="0">
-            <a:noFill/>
-          </a:ln>
-        </p:spPr>
-        <p:txBody>
-          <a:bodyPr lIns="109800" rIns="109800" tIns="109800" bIns="91440" anchor="b">
-            <a:noAutofit/>
-          </a:bodyPr>
-          <a:lstStyle>
-            <a:lvl1pPr algn="r">
-              <a:lnSpc>
-                <a:spcPct val="100000"/>
-              </a:lnSpc>
-              <a:buNone/>
-              <a:defRPr b="1" lang="en-US" sz="1600" spc="109" strike="noStrike">
-                <a:solidFill>
-                  <a:srgbClr val="404040"/>
-                </a:solidFill>
-                <a:latin typeface="Meiryo"/>
-              </a:defRPr>
-            </a:lvl1pPr>
-          </a:lstStyle>
-          <a:p>
-            <a:pPr algn="r">
-              <a:lnSpc>
-                <a:spcPct val="100000"/>
-              </a:lnSpc>
-              <a:buNone/>
-            </a:pPr>
-            <a:fld id="{030F5142-9B8D-441E-A93F-DEAC1D97FCDF}" type="slidenum">
-              <a:rPr b="1" lang="en-US" sz="1600" spc="109" strike="noStrike">
-                <a:solidFill>
-                  <a:srgbClr val="404040"/>
-                </a:solidFill>
-                <a:latin typeface="Meiryo"/>
-              </a:rPr>
-              <a:t>1</a:t>
-            </a:fld>
-            <a:endParaRPr b="0" lang="it-IT" sz="1600" spc="-1" strike="noStrike">
-              <a:latin typeface="Times New Roman"/>
-            </a:endParaRPr>
-          </a:p>
-        </p:txBody>
-      </p:sp>
-      <p:sp>
-        <p:nvSpPr>
-          <p:cNvPr id="144" name="CasellaDiTesto 2"/>
-          <p:cNvSpPr/>
-          <p:nvPr/>
-        </p:nvSpPr>
-        <p:spPr>
-          <a:xfrm>
-            <a:off x="528840" y="1441080"/>
-            <a:ext cx="11014920" cy="719280"/>
+            <a:ext cx="11014560" cy="719280"/>
           </a:xfrm>
           <a:prstGeom prst="rect">
             <a:avLst/>
@@ -9064,7 +8150,7 @@
       </p:sp>
       <p:pic>
         <p:nvPicPr>
-          <p:cNvPr id="145" name="" descr=""/>
+          <p:cNvPr id="142" name="" descr=""/>
           <p:cNvPicPr/>
           <p:nvPr/>
         </p:nvPicPr>
@@ -9075,7 +8161,7 @@
         <p:spPr>
           <a:xfrm>
             <a:off x="5490000" y="343080"/>
-            <a:ext cx="6701400" cy="6856200"/>
+            <a:ext cx="6701040" cy="6855840"/>
           </a:xfrm>
           <a:prstGeom prst="rect">
             <a:avLst/>
@@ -9087,14 +8173,14 @@
       </p:pic>
       <p:sp>
         <p:nvSpPr>
-          <p:cNvPr id="146" name=""/>
+          <p:cNvPr id="143" name=""/>
           <p:cNvSpPr/>
           <p:nvPr/>
         </p:nvSpPr>
         <p:spPr>
           <a:xfrm>
             <a:off x="384840" y="5220000"/>
-            <a:ext cx="4654440" cy="601560"/>
+            <a:ext cx="4654080" cy="601200"/>
           </a:xfrm>
           <a:prstGeom prst="rect">
             <a:avLst/>

</xml_diff>